<commit_message>
- added css - added imgs of models - added plot
</commit_message>
<xml_diff>
--- a/webs/flowchart_angebot_nutzung.pptx
+++ b/webs/flowchart_angebot_nutzung.pptx
@@ -2,18 +2,19 @@
 <file path=ppt/presentation.xml><?xml version="1.0" encoding="utf-8"?>
 <p:presentation xmlns:a="http://schemas.openxmlformats.org/drawingml/2006/main" xmlns:r="http://schemas.openxmlformats.org/officeDocument/2006/relationships" xmlns:p="http://schemas.openxmlformats.org/presentationml/2006/main" saveSubsetFonts="1">
   <p:sldMasterIdLst>
-    <p:sldMasterId id="2147483648" r:id="rId1"/>
+    <p:sldMasterId id="2147483660" r:id="rId1"/>
   </p:sldMasterIdLst>
   <p:sldIdLst>
     <p:sldId id="256" r:id="rId2"/>
+    <p:sldId id="257" r:id="rId3"/>
   </p:sldIdLst>
-  <p:sldSz cx="12192000" cy="6858000"/>
+  <p:sldSz cx="12192000" cy="4679950"/>
   <p:notesSz cx="6858000" cy="9144000"/>
   <p:defaultTextStyle>
     <a:defPPr>
-      <a:defRPr lang="de-DE"/>
+      <a:defRPr lang="en-US"/>
     </a:defPPr>
-    <a:lvl1pPr marL="0" algn="l" defTabSz="914400" rtl="0" eaLnBrk="1" latinLnBrk="0" hangingPunct="1">
+    <a:lvl1pPr marL="0" algn="l" defTabSz="457200" rtl="0" eaLnBrk="1" latinLnBrk="0" hangingPunct="1">
       <a:defRPr sz="1800" kern="1200">
         <a:solidFill>
           <a:schemeClr val="tx1"/>
@@ -23,7 +24,7 @@
         <a:cs typeface="+mn-cs"/>
       </a:defRPr>
     </a:lvl1pPr>
-    <a:lvl2pPr marL="457200" algn="l" defTabSz="914400" rtl="0" eaLnBrk="1" latinLnBrk="0" hangingPunct="1">
+    <a:lvl2pPr marL="457200" algn="l" defTabSz="457200" rtl="0" eaLnBrk="1" latinLnBrk="0" hangingPunct="1">
       <a:defRPr sz="1800" kern="1200">
         <a:solidFill>
           <a:schemeClr val="tx1"/>
@@ -33,7 +34,7 @@
         <a:cs typeface="+mn-cs"/>
       </a:defRPr>
     </a:lvl2pPr>
-    <a:lvl3pPr marL="914400" algn="l" defTabSz="914400" rtl="0" eaLnBrk="1" latinLnBrk="0" hangingPunct="1">
+    <a:lvl3pPr marL="914400" algn="l" defTabSz="457200" rtl="0" eaLnBrk="1" latinLnBrk="0" hangingPunct="1">
       <a:defRPr sz="1800" kern="1200">
         <a:solidFill>
           <a:schemeClr val="tx1"/>
@@ -43,7 +44,7 @@
         <a:cs typeface="+mn-cs"/>
       </a:defRPr>
     </a:lvl3pPr>
-    <a:lvl4pPr marL="1371600" algn="l" defTabSz="914400" rtl="0" eaLnBrk="1" latinLnBrk="0" hangingPunct="1">
+    <a:lvl4pPr marL="1371600" algn="l" defTabSz="457200" rtl="0" eaLnBrk="1" latinLnBrk="0" hangingPunct="1">
       <a:defRPr sz="1800" kern="1200">
         <a:solidFill>
           <a:schemeClr val="tx1"/>
@@ -53,7 +54,7 @@
         <a:cs typeface="+mn-cs"/>
       </a:defRPr>
     </a:lvl4pPr>
-    <a:lvl5pPr marL="1828800" algn="l" defTabSz="914400" rtl="0" eaLnBrk="1" latinLnBrk="0" hangingPunct="1">
+    <a:lvl5pPr marL="1828800" algn="l" defTabSz="457200" rtl="0" eaLnBrk="1" latinLnBrk="0" hangingPunct="1">
       <a:defRPr sz="1800" kern="1200">
         <a:solidFill>
           <a:schemeClr val="tx1"/>
@@ -63,7 +64,7 @@
         <a:cs typeface="+mn-cs"/>
       </a:defRPr>
     </a:lvl5pPr>
-    <a:lvl6pPr marL="2286000" algn="l" defTabSz="914400" rtl="0" eaLnBrk="1" latinLnBrk="0" hangingPunct="1">
+    <a:lvl6pPr marL="2286000" algn="l" defTabSz="457200" rtl="0" eaLnBrk="1" latinLnBrk="0" hangingPunct="1">
       <a:defRPr sz="1800" kern="1200">
         <a:solidFill>
           <a:schemeClr val="tx1"/>
@@ -73,7 +74,7 @@
         <a:cs typeface="+mn-cs"/>
       </a:defRPr>
     </a:lvl6pPr>
-    <a:lvl7pPr marL="2743200" algn="l" defTabSz="914400" rtl="0" eaLnBrk="1" latinLnBrk="0" hangingPunct="1">
+    <a:lvl7pPr marL="2743200" algn="l" defTabSz="457200" rtl="0" eaLnBrk="1" latinLnBrk="0" hangingPunct="1">
       <a:defRPr sz="1800" kern="1200">
         <a:solidFill>
           <a:schemeClr val="tx1"/>
@@ -83,7 +84,7 @@
         <a:cs typeface="+mn-cs"/>
       </a:defRPr>
     </a:lvl7pPr>
-    <a:lvl8pPr marL="3200400" algn="l" defTabSz="914400" rtl="0" eaLnBrk="1" latinLnBrk="0" hangingPunct="1">
+    <a:lvl8pPr marL="3200400" algn="l" defTabSz="457200" rtl="0" eaLnBrk="1" latinLnBrk="0" hangingPunct="1">
       <a:defRPr sz="1800" kern="1200">
         <a:solidFill>
           <a:schemeClr val="tx1"/>
@@ -93,7 +94,7 @@
         <a:cs typeface="+mn-cs"/>
       </a:defRPr>
     </a:lvl8pPr>
-    <a:lvl9pPr marL="3657600" algn="l" defTabSz="914400" rtl="0" eaLnBrk="1" latinLnBrk="0" hangingPunct="1">
+    <a:lvl9pPr marL="3657600" algn="l" defTabSz="457200" rtl="0" eaLnBrk="1" latinLnBrk="0" hangingPunct="1">
       <a:defRPr sz="1800" kern="1200">
         <a:solidFill>
           <a:schemeClr val="tx1"/>
@@ -131,7 +132,7 @@
       </p:grpSpPr>
       <p:sp>
         <p:nvSpPr>
-          <p:cNvPr id="2" name="Titel 1"/>
+          <p:cNvPr id="2" name="Title 1"/>
           <p:cNvSpPr>
             <a:spLocks noGrp="1"/>
           </p:cNvSpPr>
@@ -141,15 +142,15 @@
         </p:nvSpPr>
         <p:spPr>
           <a:xfrm>
-            <a:off x="1524001" y="1122363"/>
-            <a:ext cx="9144000" cy="2387600"/>
+            <a:off x="1524000" y="765909"/>
+            <a:ext cx="9144000" cy="1629316"/>
           </a:xfrm>
         </p:spPr>
         <p:txBody>
           <a:bodyPr anchor="b"/>
           <a:lstStyle>
             <a:lvl1pPr algn="ctr">
-              <a:defRPr sz="6000"/>
+              <a:defRPr sz="4094"/>
             </a:lvl1pPr>
           </a:lstStyle>
           <a:p>
@@ -157,13 +158,13 @@
               <a:rPr lang="de-DE" smtClean="0"/>
               <a:t>Titelmasterformat durch Klicken bearbeiten</a:t>
             </a:r>
-            <a:endParaRPr lang="de-DE"/>
-          </a:p>
-        </p:txBody>
-      </p:sp>
-      <p:sp>
-        <p:nvSpPr>
-          <p:cNvPr id="3" name="Untertitel 2"/>
+            <a:endParaRPr lang="en-US" dirty="0"/>
+          </a:p>
+        </p:txBody>
+      </p:sp>
+      <p:sp>
+        <p:nvSpPr>
+          <p:cNvPr id="3" name="Subtitle 2"/>
           <p:cNvSpPr>
             <a:spLocks noGrp="1"/>
           </p:cNvSpPr>
@@ -173,8 +174,8 @@
         </p:nvSpPr>
         <p:spPr>
           <a:xfrm>
-            <a:off x="1524001" y="3602038"/>
-            <a:ext cx="9144000" cy="1655762"/>
+            <a:off x="1524000" y="2458058"/>
+            <a:ext cx="9144000" cy="1129904"/>
           </a:xfrm>
         </p:spPr>
         <p:txBody>
@@ -182,39 +183,39 @@
           <a:lstStyle>
             <a:lvl1pPr marL="0" indent="0" algn="ctr">
               <a:buNone/>
-              <a:defRPr sz="2400"/>
+              <a:defRPr sz="1638"/>
             </a:lvl1pPr>
-            <a:lvl2pPr marL="457207" indent="0" algn="ctr">
-              <a:buNone/>
-              <a:defRPr sz="2000"/>
+            <a:lvl2pPr marL="311993" indent="0" algn="ctr">
+              <a:buNone/>
+              <a:defRPr sz="1365"/>
             </a:lvl2pPr>
-            <a:lvl3pPr marL="914414" indent="0" algn="ctr">
-              <a:buNone/>
-              <a:defRPr sz="1800"/>
+            <a:lvl3pPr marL="623987" indent="0" algn="ctr">
+              <a:buNone/>
+              <a:defRPr sz="1228"/>
             </a:lvl3pPr>
-            <a:lvl4pPr marL="1371621" indent="0" algn="ctr">
-              <a:buNone/>
-              <a:defRPr sz="1600"/>
+            <a:lvl4pPr marL="935980" indent="0" algn="ctr">
+              <a:buNone/>
+              <a:defRPr sz="1092"/>
             </a:lvl4pPr>
-            <a:lvl5pPr marL="1828828" indent="0" algn="ctr">
-              <a:buNone/>
-              <a:defRPr sz="1600"/>
+            <a:lvl5pPr marL="1247973" indent="0" algn="ctr">
+              <a:buNone/>
+              <a:defRPr sz="1092"/>
             </a:lvl5pPr>
-            <a:lvl6pPr marL="2286035" indent="0" algn="ctr">
-              <a:buNone/>
-              <a:defRPr sz="1600"/>
+            <a:lvl6pPr marL="1559966" indent="0" algn="ctr">
+              <a:buNone/>
+              <a:defRPr sz="1092"/>
             </a:lvl6pPr>
-            <a:lvl7pPr marL="2743242" indent="0" algn="ctr">
-              <a:buNone/>
-              <a:defRPr sz="1600"/>
+            <a:lvl7pPr marL="1871960" indent="0" algn="ctr">
+              <a:buNone/>
+              <a:defRPr sz="1092"/>
             </a:lvl7pPr>
-            <a:lvl8pPr marL="3200449" indent="0" algn="ctr">
-              <a:buNone/>
-              <a:defRPr sz="1600"/>
+            <a:lvl8pPr marL="2183953" indent="0" algn="ctr">
+              <a:buNone/>
+              <a:defRPr sz="1092"/>
             </a:lvl8pPr>
-            <a:lvl9pPr marL="3657656" indent="0" algn="ctr">
-              <a:buNone/>
-              <a:defRPr sz="1600"/>
+            <a:lvl9pPr marL="2495946" indent="0" algn="ctr">
+              <a:buNone/>
+              <a:defRPr sz="1092"/>
             </a:lvl9pPr>
           </a:lstStyle>
           <a:p>
@@ -222,13 +223,13 @@
               <a:rPr lang="de-DE" smtClean="0"/>
               <a:t>Formatvorlage des Untertitelmasters durch Klicken bearbeiten</a:t>
             </a:r>
-            <a:endParaRPr lang="de-DE"/>
-          </a:p>
-        </p:txBody>
-      </p:sp>
-      <p:sp>
-        <p:nvSpPr>
-          <p:cNvPr id="4" name="Datumsplatzhalter 3"/>
+            <a:endParaRPr lang="en-US" dirty="0"/>
+          </a:p>
+        </p:txBody>
+      </p:sp>
+      <p:sp>
+        <p:nvSpPr>
+          <p:cNvPr id="4" name="Date Placeholder 3"/>
           <p:cNvSpPr>
             <a:spLocks noGrp="1"/>
           </p:cNvSpPr>
@@ -243,7 +244,7 @@
           <a:p>
             <a:fld id="{B7C59FFB-51EC-4DB4-A90A-AC9385E36DD4}" type="datetimeFigureOut">
               <a:rPr lang="de-DE" smtClean="0"/>
-              <a:t>13.02.2019</a:t>
+              <a:t>14.02.2019</a:t>
             </a:fld>
             <a:endParaRPr lang="de-DE"/>
           </a:p>
@@ -251,7 +252,7 @@
       </p:sp>
       <p:sp>
         <p:nvSpPr>
-          <p:cNvPr id="5" name="Fußzeilenplatzhalter 4"/>
+          <p:cNvPr id="5" name="Footer Placeholder 4"/>
           <p:cNvSpPr>
             <a:spLocks noGrp="1"/>
           </p:cNvSpPr>
@@ -270,7 +271,7 @@
       </p:sp>
       <p:sp>
         <p:nvSpPr>
-          <p:cNvPr id="6" name="Foliennummernplatzhalter 5"/>
+          <p:cNvPr id="6" name="Slide Number Placeholder 5"/>
           <p:cNvSpPr>
             <a:spLocks noGrp="1"/>
           </p:cNvSpPr>
@@ -294,7 +295,7 @@
     </p:spTree>
     <p:extLst>
       <p:ext uri="{BB962C8B-B14F-4D97-AF65-F5344CB8AC3E}">
-        <p14:creationId xmlns:p14="http://schemas.microsoft.com/office/powerpoint/2010/main" val="3816806216"/>
+        <p14:creationId xmlns:p14="http://schemas.microsoft.com/office/powerpoint/2010/main" val="699143918"/>
       </p:ext>
     </p:extLst>
   </p:cSld>
@@ -323,7 +324,7 @@
       </p:grpSpPr>
       <p:sp>
         <p:nvSpPr>
-          <p:cNvPr id="2" name="Titel 1"/>
+          <p:cNvPr id="2" name="Title 1"/>
           <p:cNvSpPr>
             <a:spLocks noGrp="1"/>
           </p:cNvSpPr>
@@ -340,13 +341,13 @@
               <a:rPr lang="de-DE" smtClean="0"/>
               <a:t>Titelmasterformat durch Klicken bearbeiten</a:t>
             </a:r>
-            <a:endParaRPr lang="de-DE"/>
-          </a:p>
-        </p:txBody>
-      </p:sp>
-      <p:sp>
-        <p:nvSpPr>
-          <p:cNvPr id="3" name="Vertikaler Textplatzhalter 2"/>
+            <a:endParaRPr lang="en-US" dirty="0"/>
+          </a:p>
+        </p:txBody>
+      </p:sp>
+      <p:sp>
+        <p:nvSpPr>
+          <p:cNvPr id="3" name="Vertical Text Placeholder 2"/>
           <p:cNvSpPr>
             <a:spLocks noGrp="1"/>
           </p:cNvSpPr>
@@ -392,13 +393,13 @@
               <a:rPr lang="de-DE" smtClean="0"/>
               <a:t>Fünfte Ebene</a:t>
             </a:r>
-            <a:endParaRPr lang="de-DE"/>
-          </a:p>
-        </p:txBody>
-      </p:sp>
-      <p:sp>
-        <p:nvSpPr>
-          <p:cNvPr id="4" name="Datumsplatzhalter 3"/>
+            <a:endParaRPr lang="en-US" dirty="0"/>
+          </a:p>
+        </p:txBody>
+      </p:sp>
+      <p:sp>
+        <p:nvSpPr>
+          <p:cNvPr id="4" name="Date Placeholder 3"/>
           <p:cNvSpPr>
             <a:spLocks noGrp="1"/>
           </p:cNvSpPr>
@@ -413,7 +414,7 @@
           <a:p>
             <a:fld id="{B7C59FFB-51EC-4DB4-A90A-AC9385E36DD4}" type="datetimeFigureOut">
               <a:rPr lang="de-DE" smtClean="0"/>
-              <a:t>13.02.2019</a:t>
+              <a:t>14.02.2019</a:t>
             </a:fld>
             <a:endParaRPr lang="de-DE"/>
           </a:p>
@@ -421,7 +422,7 @@
       </p:sp>
       <p:sp>
         <p:nvSpPr>
-          <p:cNvPr id="5" name="Fußzeilenplatzhalter 4"/>
+          <p:cNvPr id="5" name="Footer Placeholder 4"/>
           <p:cNvSpPr>
             <a:spLocks noGrp="1"/>
           </p:cNvSpPr>
@@ -440,7 +441,7 @@
       </p:sp>
       <p:sp>
         <p:nvSpPr>
-          <p:cNvPr id="6" name="Foliennummernplatzhalter 5"/>
+          <p:cNvPr id="6" name="Slide Number Placeholder 5"/>
           <p:cNvSpPr>
             <a:spLocks noGrp="1"/>
           </p:cNvSpPr>
@@ -464,7 +465,7 @@
     </p:spTree>
     <p:extLst>
       <p:ext uri="{BB962C8B-B14F-4D97-AF65-F5344CB8AC3E}">
-        <p14:creationId xmlns:p14="http://schemas.microsoft.com/office/powerpoint/2010/main" val="3969082050"/>
+        <p14:creationId xmlns:p14="http://schemas.microsoft.com/office/powerpoint/2010/main" val="952501860"/>
       </p:ext>
     </p:extLst>
   </p:cSld>
@@ -493,7 +494,7 @@
       </p:grpSpPr>
       <p:sp>
         <p:nvSpPr>
-          <p:cNvPr id="2" name="Vertikaler Titel 1"/>
+          <p:cNvPr id="2" name="Vertical Title 1"/>
           <p:cNvSpPr>
             <a:spLocks noGrp="1"/>
           </p:cNvSpPr>
@@ -503,8 +504,8 @@
         </p:nvSpPr>
         <p:spPr>
           <a:xfrm>
-            <a:off x="8724900" y="365125"/>
-            <a:ext cx="2628900" cy="5811838"/>
+            <a:off x="8724900" y="249164"/>
+            <a:ext cx="2628900" cy="3966041"/>
           </a:xfrm>
         </p:spPr>
         <p:txBody>
@@ -515,13 +516,13 @@
               <a:rPr lang="de-DE" smtClean="0"/>
               <a:t>Titelmasterformat durch Klicken bearbeiten</a:t>
             </a:r>
-            <a:endParaRPr lang="de-DE"/>
-          </a:p>
-        </p:txBody>
-      </p:sp>
-      <p:sp>
-        <p:nvSpPr>
-          <p:cNvPr id="3" name="Vertikaler Textplatzhalter 2"/>
+            <a:endParaRPr lang="en-US" dirty="0"/>
+          </a:p>
+        </p:txBody>
+      </p:sp>
+      <p:sp>
+        <p:nvSpPr>
+          <p:cNvPr id="3" name="Vertical Text Placeholder 2"/>
           <p:cNvSpPr>
             <a:spLocks noGrp="1"/>
           </p:cNvSpPr>
@@ -531,8 +532,8 @@
         </p:nvSpPr>
         <p:spPr>
           <a:xfrm>
-            <a:off x="838200" y="365125"/>
-            <a:ext cx="7734300" cy="5811838"/>
+            <a:off x="838200" y="249164"/>
+            <a:ext cx="7734300" cy="3966041"/>
           </a:xfrm>
         </p:spPr>
         <p:txBody>
@@ -572,13 +573,13 @@
               <a:rPr lang="de-DE" smtClean="0"/>
               <a:t>Fünfte Ebene</a:t>
             </a:r>
-            <a:endParaRPr lang="de-DE"/>
-          </a:p>
-        </p:txBody>
-      </p:sp>
-      <p:sp>
-        <p:nvSpPr>
-          <p:cNvPr id="4" name="Datumsplatzhalter 3"/>
+            <a:endParaRPr lang="en-US" dirty="0"/>
+          </a:p>
+        </p:txBody>
+      </p:sp>
+      <p:sp>
+        <p:nvSpPr>
+          <p:cNvPr id="4" name="Date Placeholder 3"/>
           <p:cNvSpPr>
             <a:spLocks noGrp="1"/>
           </p:cNvSpPr>
@@ -593,7 +594,7 @@
           <a:p>
             <a:fld id="{B7C59FFB-51EC-4DB4-A90A-AC9385E36DD4}" type="datetimeFigureOut">
               <a:rPr lang="de-DE" smtClean="0"/>
-              <a:t>13.02.2019</a:t>
+              <a:t>14.02.2019</a:t>
             </a:fld>
             <a:endParaRPr lang="de-DE"/>
           </a:p>
@@ -601,7 +602,7 @@
       </p:sp>
       <p:sp>
         <p:nvSpPr>
-          <p:cNvPr id="5" name="Fußzeilenplatzhalter 4"/>
+          <p:cNvPr id="5" name="Footer Placeholder 4"/>
           <p:cNvSpPr>
             <a:spLocks noGrp="1"/>
           </p:cNvSpPr>
@@ -620,7 +621,7 @@
       </p:sp>
       <p:sp>
         <p:nvSpPr>
-          <p:cNvPr id="6" name="Foliennummernplatzhalter 5"/>
+          <p:cNvPr id="6" name="Slide Number Placeholder 5"/>
           <p:cNvSpPr>
             <a:spLocks noGrp="1"/>
           </p:cNvSpPr>
@@ -644,7 +645,7 @@
     </p:spTree>
     <p:extLst>
       <p:ext uri="{BB962C8B-B14F-4D97-AF65-F5344CB8AC3E}">
-        <p14:creationId xmlns:p14="http://schemas.microsoft.com/office/powerpoint/2010/main" val="142525381"/>
+        <p14:creationId xmlns:p14="http://schemas.microsoft.com/office/powerpoint/2010/main" val="648885652"/>
       </p:ext>
     </p:extLst>
   </p:cSld>
@@ -673,7 +674,7 @@
       </p:grpSpPr>
       <p:sp>
         <p:nvSpPr>
-          <p:cNvPr id="2" name="Titel 1"/>
+          <p:cNvPr id="2" name="Title 1"/>
           <p:cNvSpPr>
             <a:spLocks noGrp="1"/>
           </p:cNvSpPr>
@@ -690,13 +691,13 @@
               <a:rPr lang="de-DE" smtClean="0"/>
               <a:t>Titelmasterformat durch Klicken bearbeiten</a:t>
             </a:r>
-            <a:endParaRPr lang="de-DE"/>
-          </a:p>
-        </p:txBody>
-      </p:sp>
-      <p:sp>
-        <p:nvSpPr>
-          <p:cNvPr id="3" name="Inhaltsplatzhalter 2"/>
+            <a:endParaRPr lang="en-US" dirty="0"/>
+          </a:p>
+        </p:txBody>
+      </p:sp>
+      <p:sp>
+        <p:nvSpPr>
+          <p:cNvPr id="3" name="Content Placeholder 2"/>
           <p:cNvSpPr>
             <a:spLocks noGrp="1"/>
           </p:cNvSpPr>
@@ -742,13 +743,13 @@
               <a:rPr lang="de-DE" smtClean="0"/>
               <a:t>Fünfte Ebene</a:t>
             </a:r>
-            <a:endParaRPr lang="de-DE"/>
-          </a:p>
-        </p:txBody>
-      </p:sp>
-      <p:sp>
-        <p:nvSpPr>
-          <p:cNvPr id="4" name="Datumsplatzhalter 3"/>
+            <a:endParaRPr lang="en-US" dirty="0"/>
+          </a:p>
+        </p:txBody>
+      </p:sp>
+      <p:sp>
+        <p:nvSpPr>
+          <p:cNvPr id="4" name="Date Placeholder 3"/>
           <p:cNvSpPr>
             <a:spLocks noGrp="1"/>
           </p:cNvSpPr>
@@ -763,7 +764,7 @@
           <a:p>
             <a:fld id="{B7C59FFB-51EC-4DB4-A90A-AC9385E36DD4}" type="datetimeFigureOut">
               <a:rPr lang="de-DE" smtClean="0"/>
-              <a:t>13.02.2019</a:t>
+              <a:t>14.02.2019</a:t>
             </a:fld>
             <a:endParaRPr lang="de-DE"/>
           </a:p>
@@ -771,7 +772,7 @@
       </p:sp>
       <p:sp>
         <p:nvSpPr>
-          <p:cNvPr id="5" name="Fußzeilenplatzhalter 4"/>
+          <p:cNvPr id="5" name="Footer Placeholder 4"/>
           <p:cNvSpPr>
             <a:spLocks noGrp="1"/>
           </p:cNvSpPr>
@@ -790,7 +791,7 @@
       </p:sp>
       <p:sp>
         <p:nvSpPr>
-          <p:cNvPr id="6" name="Foliennummernplatzhalter 5"/>
+          <p:cNvPr id="6" name="Slide Number Placeholder 5"/>
           <p:cNvSpPr>
             <a:spLocks noGrp="1"/>
           </p:cNvSpPr>
@@ -814,7 +815,7 @@
     </p:spTree>
     <p:extLst>
       <p:ext uri="{BB962C8B-B14F-4D97-AF65-F5344CB8AC3E}">
-        <p14:creationId xmlns:p14="http://schemas.microsoft.com/office/powerpoint/2010/main" val="409065887"/>
+        <p14:creationId xmlns:p14="http://schemas.microsoft.com/office/powerpoint/2010/main" val="3389808050"/>
       </p:ext>
     </p:extLst>
   </p:cSld>
@@ -843,7 +844,7 @@
       </p:grpSpPr>
       <p:sp>
         <p:nvSpPr>
-          <p:cNvPr id="2" name="Titel 1"/>
+          <p:cNvPr id="2" name="Title 1"/>
           <p:cNvSpPr>
             <a:spLocks noGrp="1"/>
           </p:cNvSpPr>
@@ -853,15 +854,15 @@
         </p:nvSpPr>
         <p:spPr>
           <a:xfrm>
-            <a:off x="831851" y="1709740"/>
-            <a:ext cx="10515600" cy="2852737"/>
+            <a:off x="831850" y="1166738"/>
+            <a:ext cx="10515600" cy="1946729"/>
           </a:xfrm>
         </p:spPr>
         <p:txBody>
           <a:bodyPr anchor="b"/>
           <a:lstStyle>
             <a:lvl1pPr>
-              <a:defRPr sz="6000"/>
+              <a:defRPr sz="4094"/>
             </a:lvl1pPr>
           </a:lstStyle>
           <a:p>
@@ -869,13 +870,13 @@
               <a:rPr lang="de-DE" smtClean="0"/>
               <a:t>Titelmasterformat durch Klicken bearbeiten</a:t>
             </a:r>
-            <a:endParaRPr lang="de-DE"/>
-          </a:p>
-        </p:txBody>
-      </p:sp>
-      <p:sp>
-        <p:nvSpPr>
-          <p:cNvPr id="3" name="Textplatzhalter 2"/>
+            <a:endParaRPr lang="en-US" dirty="0"/>
+          </a:p>
+        </p:txBody>
+      </p:sp>
+      <p:sp>
+        <p:nvSpPr>
+          <p:cNvPr id="3" name="Text Placeholder 2"/>
           <p:cNvSpPr>
             <a:spLocks noGrp="1"/>
           </p:cNvSpPr>
@@ -885,8 +886,8 @@
         </p:nvSpPr>
         <p:spPr>
           <a:xfrm>
-            <a:off x="831851" y="4589465"/>
-            <a:ext cx="10515600" cy="1500187"/>
+            <a:off x="831850" y="3131884"/>
+            <a:ext cx="10515600" cy="1023739"/>
           </a:xfrm>
         </p:spPr>
         <p:txBody>
@@ -894,7 +895,7 @@
           <a:lstStyle>
             <a:lvl1pPr marL="0" indent="0">
               <a:buNone/>
-              <a:defRPr sz="2400">
+              <a:defRPr sz="1638">
                 <a:solidFill>
                   <a:schemeClr val="tx1">
                     <a:tint val="75000"/>
@@ -902,9 +903,9 @@
                 </a:solidFill>
               </a:defRPr>
             </a:lvl1pPr>
-            <a:lvl2pPr marL="457207" indent="0">
-              <a:buNone/>
-              <a:defRPr sz="2000">
+            <a:lvl2pPr marL="311993" indent="0">
+              <a:buNone/>
+              <a:defRPr sz="1365">
                 <a:solidFill>
                   <a:schemeClr val="tx1">
                     <a:tint val="75000"/>
@@ -912,9 +913,9 @@
                 </a:solidFill>
               </a:defRPr>
             </a:lvl2pPr>
-            <a:lvl3pPr marL="914414" indent="0">
-              <a:buNone/>
-              <a:defRPr sz="1800">
+            <a:lvl3pPr marL="623987" indent="0">
+              <a:buNone/>
+              <a:defRPr sz="1228">
                 <a:solidFill>
                   <a:schemeClr val="tx1">
                     <a:tint val="75000"/>
@@ -922,9 +923,9 @@
                 </a:solidFill>
               </a:defRPr>
             </a:lvl3pPr>
-            <a:lvl4pPr marL="1371621" indent="0">
-              <a:buNone/>
-              <a:defRPr sz="1600">
+            <a:lvl4pPr marL="935980" indent="0">
+              <a:buNone/>
+              <a:defRPr sz="1092">
                 <a:solidFill>
                   <a:schemeClr val="tx1">
                     <a:tint val="75000"/>
@@ -932,9 +933,9 @@
                 </a:solidFill>
               </a:defRPr>
             </a:lvl4pPr>
-            <a:lvl5pPr marL="1828828" indent="0">
-              <a:buNone/>
-              <a:defRPr sz="1600">
+            <a:lvl5pPr marL="1247973" indent="0">
+              <a:buNone/>
+              <a:defRPr sz="1092">
                 <a:solidFill>
                   <a:schemeClr val="tx1">
                     <a:tint val="75000"/>
@@ -942,9 +943,9 @@
                 </a:solidFill>
               </a:defRPr>
             </a:lvl5pPr>
-            <a:lvl6pPr marL="2286035" indent="0">
-              <a:buNone/>
-              <a:defRPr sz="1600">
+            <a:lvl6pPr marL="1559966" indent="0">
+              <a:buNone/>
+              <a:defRPr sz="1092">
                 <a:solidFill>
                   <a:schemeClr val="tx1">
                     <a:tint val="75000"/>
@@ -952,9 +953,9 @@
                 </a:solidFill>
               </a:defRPr>
             </a:lvl6pPr>
-            <a:lvl7pPr marL="2743242" indent="0">
-              <a:buNone/>
-              <a:defRPr sz="1600">
+            <a:lvl7pPr marL="1871960" indent="0">
+              <a:buNone/>
+              <a:defRPr sz="1092">
                 <a:solidFill>
                   <a:schemeClr val="tx1">
                     <a:tint val="75000"/>
@@ -962,9 +963,9 @@
                 </a:solidFill>
               </a:defRPr>
             </a:lvl7pPr>
-            <a:lvl8pPr marL="3200449" indent="0">
-              <a:buNone/>
-              <a:defRPr sz="1600">
+            <a:lvl8pPr marL="2183953" indent="0">
+              <a:buNone/>
+              <a:defRPr sz="1092">
                 <a:solidFill>
                   <a:schemeClr val="tx1">
                     <a:tint val="75000"/>
@@ -972,9 +973,9 @@
                 </a:solidFill>
               </a:defRPr>
             </a:lvl8pPr>
-            <a:lvl9pPr marL="3657656" indent="0">
-              <a:buNone/>
-              <a:defRPr sz="1600">
+            <a:lvl9pPr marL="2495946" indent="0">
+              <a:buNone/>
+              <a:defRPr sz="1092">
                 <a:solidFill>
                   <a:schemeClr val="tx1">
                     <a:tint val="75000"/>
@@ -994,7 +995,7 @@
       </p:sp>
       <p:sp>
         <p:nvSpPr>
-          <p:cNvPr id="4" name="Datumsplatzhalter 3"/>
+          <p:cNvPr id="4" name="Date Placeholder 3"/>
           <p:cNvSpPr>
             <a:spLocks noGrp="1"/>
           </p:cNvSpPr>
@@ -1009,7 +1010,7 @@
           <a:p>
             <a:fld id="{B7C59FFB-51EC-4DB4-A90A-AC9385E36DD4}" type="datetimeFigureOut">
               <a:rPr lang="de-DE" smtClean="0"/>
-              <a:t>13.02.2019</a:t>
+              <a:t>14.02.2019</a:t>
             </a:fld>
             <a:endParaRPr lang="de-DE"/>
           </a:p>
@@ -1017,7 +1018,7 @@
       </p:sp>
       <p:sp>
         <p:nvSpPr>
-          <p:cNvPr id="5" name="Fußzeilenplatzhalter 4"/>
+          <p:cNvPr id="5" name="Footer Placeholder 4"/>
           <p:cNvSpPr>
             <a:spLocks noGrp="1"/>
           </p:cNvSpPr>
@@ -1036,7 +1037,7 @@
       </p:sp>
       <p:sp>
         <p:nvSpPr>
-          <p:cNvPr id="6" name="Foliennummernplatzhalter 5"/>
+          <p:cNvPr id="6" name="Slide Number Placeholder 5"/>
           <p:cNvSpPr>
             <a:spLocks noGrp="1"/>
           </p:cNvSpPr>
@@ -1060,7 +1061,7 @@
     </p:spTree>
     <p:extLst>
       <p:ext uri="{BB962C8B-B14F-4D97-AF65-F5344CB8AC3E}">
-        <p14:creationId xmlns:p14="http://schemas.microsoft.com/office/powerpoint/2010/main" val="2138995449"/>
+        <p14:creationId xmlns:p14="http://schemas.microsoft.com/office/powerpoint/2010/main" val="2541573006"/>
       </p:ext>
     </p:extLst>
   </p:cSld>
@@ -1089,7 +1090,7 @@
       </p:grpSpPr>
       <p:sp>
         <p:nvSpPr>
-          <p:cNvPr id="2" name="Titel 1"/>
+          <p:cNvPr id="2" name="Title 1"/>
           <p:cNvSpPr>
             <a:spLocks noGrp="1"/>
           </p:cNvSpPr>
@@ -1106,13 +1107,13 @@
               <a:rPr lang="de-DE" smtClean="0"/>
               <a:t>Titelmasterformat durch Klicken bearbeiten</a:t>
             </a:r>
-            <a:endParaRPr lang="de-DE"/>
-          </a:p>
-        </p:txBody>
-      </p:sp>
-      <p:sp>
-        <p:nvSpPr>
-          <p:cNvPr id="3" name="Inhaltsplatzhalter 2"/>
+            <a:endParaRPr lang="en-US" dirty="0"/>
+          </a:p>
+        </p:txBody>
+      </p:sp>
+      <p:sp>
+        <p:nvSpPr>
+          <p:cNvPr id="3" name="Content Placeholder 2"/>
           <p:cNvSpPr>
             <a:spLocks noGrp="1"/>
           </p:cNvSpPr>
@@ -1122,8 +1123,8 @@
         </p:nvSpPr>
         <p:spPr>
           <a:xfrm>
-            <a:off x="838201" y="1825625"/>
-            <a:ext cx="5181600" cy="4351338"/>
+            <a:off x="838200" y="1245820"/>
+            <a:ext cx="5181600" cy="2969385"/>
           </a:xfrm>
         </p:spPr>
         <p:txBody>
@@ -1163,13 +1164,13 @@
               <a:rPr lang="de-DE" smtClean="0"/>
               <a:t>Fünfte Ebene</a:t>
             </a:r>
-            <a:endParaRPr lang="de-DE"/>
-          </a:p>
-        </p:txBody>
-      </p:sp>
-      <p:sp>
-        <p:nvSpPr>
-          <p:cNvPr id="4" name="Inhaltsplatzhalter 3"/>
+            <a:endParaRPr lang="en-US" dirty="0"/>
+          </a:p>
+        </p:txBody>
+      </p:sp>
+      <p:sp>
+        <p:nvSpPr>
+          <p:cNvPr id="4" name="Content Placeholder 3"/>
           <p:cNvSpPr>
             <a:spLocks noGrp="1"/>
           </p:cNvSpPr>
@@ -1179,8 +1180,8 @@
         </p:nvSpPr>
         <p:spPr>
           <a:xfrm>
-            <a:off x="6172200" y="1825625"/>
-            <a:ext cx="5181600" cy="4351338"/>
+            <a:off x="6172200" y="1245820"/>
+            <a:ext cx="5181600" cy="2969385"/>
           </a:xfrm>
         </p:spPr>
         <p:txBody>
@@ -1220,13 +1221,13 @@
               <a:rPr lang="de-DE" smtClean="0"/>
               <a:t>Fünfte Ebene</a:t>
             </a:r>
-            <a:endParaRPr lang="de-DE"/>
-          </a:p>
-        </p:txBody>
-      </p:sp>
-      <p:sp>
-        <p:nvSpPr>
-          <p:cNvPr id="5" name="Datumsplatzhalter 4"/>
+            <a:endParaRPr lang="en-US" dirty="0"/>
+          </a:p>
+        </p:txBody>
+      </p:sp>
+      <p:sp>
+        <p:nvSpPr>
+          <p:cNvPr id="5" name="Date Placeholder 4"/>
           <p:cNvSpPr>
             <a:spLocks noGrp="1"/>
           </p:cNvSpPr>
@@ -1241,7 +1242,7 @@
           <a:p>
             <a:fld id="{B7C59FFB-51EC-4DB4-A90A-AC9385E36DD4}" type="datetimeFigureOut">
               <a:rPr lang="de-DE" smtClean="0"/>
-              <a:t>13.02.2019</a:t>
+              <a:t>14.02.2019</a:t>
             </a:fld>
             <a:endParaRPr lang="de-DE"/>
           </a:p>
@@ -1249,7 +1250,7 @@
       </p:sp>
       <p:sp>
         <p:nvSpPr>
-          <p:cNvPr id="6" name="Fußzeilenplatzhalter 5"/>
+          <p:cNvPr id="6" name="Footer Placeholder 5"/>
           <p:cNvSpPr>
             <a:spLocks noGrp="1"/>
           </p:cNvSpPr>
@@ -1268,7 +1269,7 @@
       </p:sp>
       <p:sp>
         <p:nvSpPr>
-          <p:cNvPr id="7" name="Foliennummernplatzhalter 6"/>
+          <p:cNvPr id="7" name="Slide Number Placeholder 6"/>
           <p:cNvSpPr>
             <a:spLocks noGrp="1"/>
           </p:cNvSpPr>
@@ -1292,7 +1293,7 @@
     </p:spTree>
     <p:extLst>
       <p:ext uri="{BB962C8B-B14F-4D97-AF65-F5344CB8AC3E}">
-        <p14:creationId xmlns:p14="http://schemas.microsoft.com/office/powerpoint/2010/main" val="2508932753"/>
+        <p14:creationId xmlns:p14="http://schemas.microsoft.com/office/powerpoint/2010/main" val="64224556"/>
       </p:ext>
     </p:extLst>
   </p:cSld>
@@ -1321,7 +1322,7 @@
       </p:grpSpPr>
       <p:sp>
         <p:nvSpPr>
-          <p:cNvPr id="2" name="Titel 1"/>
+          <p:cNvPr id="2" name="Title 1"/>
           <p:cNvSpPr>
             <a:spLocks noGrp="1"/>
           </p:cNvSpPr>
@@ -1331,8 +1332,8 @@
         </p:nvSpPr>
         <p:spPr>
           <a:xfrm>
-            <a:off x="839788" y="365127"/>
-            <a:ext cx="10515600" cy="1325563"/>
+            <a:off x="839788" y="249164"/>
+            <a:ext cx="10515600" cy="904574"/>
           </a:xfrm>
         </p:spPr>
         <p:txBody>
@@ -1343,13 +1344,13 @@
               <a:rPr lang="de-DE" smtClean="0"/>
               <a:t>Titelmasterformat durch Klicken bearbeiten</a:t>
             </a:r>
-            <a:endParaRPr lang="de-DE"/>
-          </a:p>
-        </p:txBody>
-      </p:sp>
-      <p:sp>
-        <p:nvSpPr>
-          <p:cNvPr id="3" name="Textplatzhalter 2"/>
+            <a:endParaRPr lang="en-US" dirty="0"/>
+          </a:p>
+        </p:txBody>
+      </p:sp>
+      <p:sp>
+        <p:nvSpPr>
+          <p:cNvPr id="3" name="Text Placeholder 2"/>
           <p:cNvSpPr>
             <a:spLocks noGrp="1"/>
           </p:cNvSpPr>
@@ -1359,8 +1360,8 @@
         </p:nvSpPr>
         <p:spPr>
           <a:xfrm>
-            <a:off x="839789" y="1681163"/>
-            <a:ext cx="5157787" cy="823912"/>
+            <a:off x="839789" y="1147238"/>
+            <a:ext cx="5157787" cy="562244"/>
           </a:xfrm>
         </p:spPr>
         <p:txBody>
@@ -1368,39 +1369,39 @@
           <a:lstStyle>
             <a:lvl1pPr marL="0" indent="0">
               <a:buNone/>
-              <a:defRPr sz="2400" b="1"/>
+              <a:defRPr sz="1638" b="1"/>
             </a:lvl1pPr>
-            <a:lvl2pPr marL="457207" indent="0">
-              <a:buNone/>
-              <a:defRPr sz="2000" b="1"/>
+            <a:lvl2pPr marL="311993" indent="0">
+              <a:buNone/>
+              <a:defRPr sz="1365" b="1"/>
             </a:lvl2pPr>
-            <a:lvl3pPr marL="914414" indent="0">
-              <a:buNone/>
-              <a:defRPr sz="1800" b="1"/>
+            <a:lvl3pPr marL="623987" indent="0">
+              <a:buNone/>
+              <a:defRPr sz="1228" b="1"/>
             </a:lvl3pPr>
-            <a:lvl4pPr marL="1371621" indent="0">
-              <a:buNone/>
-              <a:defRPr sz="1600" b="1"/>
+            <a:lvl4pPr marL="935980" indent="0">
+              <a:buNone/>
+              <a:defRPr sz="1092" b="1"/>
             </a:lvl4pPr>
-            <a:lvl5pPr marL="1828828" indent="0">
-              <a:buNone/>
-              <a:defRPr sz="1600" b="1"/>
+            <a:lvl5pPr marL="1247973" indent="0">
+              <a:buNone/>
+              <a:defRPr sz="1092" b="1"/>
             </a:lvl5pPr>
-            <a:lvl6pPr marL="2286035" indent="0">
-              <a:buNone/>
-              <a:defRPr sz="1600" b="1"/>
+            <a:lvl6pPr marL="1559966" indent="0">
+              <a:buNone/>
+              <a:defRPr sz="1092" b="1"/>
             </a:lvl6pPr>
-            <a:lvl7pPr marL="2743242" indent="0">
-              <a:buNone/>
-              <a:defRPr sz="1600" b="1"/>
+            <a:lvl7pPr marL="1871960" indent="0">
+              <a:buNone/>
+              <a:defRPr sz="1092" b="1"/>
             </a:lvl7pPr>
-            <a:lvl8pPr marL="3200449" indent="0">
-              <a:buNone/>
-              <a:defRPr sz="1600" b="1"/>
+            <a:lvl8pPr marL="2183953" indent="0">
+              <a:buNone/>
+              <a:defRPr sz="1092" b="1"/>
             </a:lvl8pPr>
-            <a:lvl9pPr marL="3657656" indent="0">
-              <a:buNone/>
-              <a:defRPr sz="1600" b="1"/>
+            <a:lvl9pPr marL="2495946" indent="0">
+              <a:buNone/>
+              <a:defRPr sz="1092" b="1"/>
             </a:lvl9pPr>
           </a:lstStyle>
           <a:p>
@@ -1414,7 +1415,7 @@
       </p:sp>
       <p:sp>
         <p:nvSpPr>
-          <p:cNvPr id="4" name="Inhaltsplatzhalter 3"/>
+          <p:cNvPr id="4" name="Content Placeholder 3"/>
           <p:cNvSpPr>
             <a:spLocks noGrp="1"/>
           </p:cNvSpPr>
@@ -1424,8 +1425,8 @@
         </p:nvSpPr>
         <p:spPr>
           <a:xfrm>
-            <a:off x="839789" y="2505075"/>
-            <a:ext cx="5157787" cy="3684588"/>
+            <a:off x="839789" y="1709482"/>
+            <a:ext cx="5157787" cy="2514390"/>
           </a:xfrm>
         </p:spPr>
         <p:txBody>
@@ -1465,13 +1466,13 @@
               <a:rPr lang="de-DE" smtClean="0"/>
               <a:t>Fünfte Ebene</a:t>
             </a:r>
-            <a:endParaRPr lang="de-DE"/>
-          </a:p>
-        </p:txBody>
-      </p:sp>
-      <p:sp>
-        <p:nvSpPr>
-          <p:cNvPr id="5" name="Textplatzhalter 4"/>
+            <a:endParaRPr lang="en-US" dirty="0"/>
+          </a:p>
+        </p:txBody>
+      </p:sp>
+      <p:sp>
+        <p:nvSpPr>
+          <p:cNvPr id="5" name="Text Placeholder 4"/>
           <p:cNvSpPr>
             <a:spLocks noGrp="1"/>
           </p:cNvSpPr>
@@ -1481,8 +1482,8 @@
         </p:nvSpPr>
         <p:spPr>
           <a:xfrm>
-            <a:off x="6172200" y="1681163"/>
-            <a:ext cx="5183188" cy="823912"/>
+            <a:off x="6172200" y="1147238"/>
+            <a:ext cx="5183188" cy="562244"/>
           </a:xfrm>
         </p:spPr>
         <p:txBody>
@@ -1490,39 +1491,39 @@
           <a:lstStyle>
             <a:lvl1pPr marL="0" indent="0">
               <a:buNone/>
-              <a:defRPr sz="2400" b="1"/>
+              <a:defRPr sz="1638" b="1"/>
             </a:lvl1pPr>
-            <a:lvl2pPr marL="457207" indent="0">
-              <a:buNone/>
-              <a:defRPr sz="2000" b="1"/>
+            <a:lvl2pPr marL="311993" indent="0">
+              <a:buNone/>
+              <a:defRPr sz="1365" b="1"/>
             </a:lvl2pPr>
-            <a:lvl3pPr marL="914414" indent="0">
-              <a:buNone/>
-              <a:defRPr sz="1800" b="1"/>
+            <a:lvl3pPr marL="623987" indent="0">
+              <a:buNone/>
+              <a:defRPr sz="1228" b="1"/>
             </a:lvl3pPr>
-            <a:lvl4pPr marL="1371621" indent="0">
-              <a:buNone/>
-              <a:defRPr sz="1600" b="1"/>
+            <a:lvl4pPr marL="935980" indent="0">
+              <a:buNone/>
+              <a:defRPr sz="1092" b="1"/>
             </a:lvl4pPr>
-            <a:lvl5pPr marL="1828828" indent="0">
-              <a:buNone/>
-              <a:defRPr sz="1600" b="1"/>
+            <a:lvl5pPr marL="1247973" indent="0">
+              <a:buNone/>
+              <a:defRPr sz="1092" b="1"/>
             </a:lvl5pPr>
-            <a:lvl6pPr marL="2286035" indent="0">
-              <a:buNone/>
-              <a:defRPr sz="1600" b="1"/>
+            <a:lvl6pPr marL="1559966" indent="0">
+              <a:buNone/>
+              <a:defRPr sz="1092" b="1"/>
             </a:lvl6pPr>
-            <a:lvl7pPr marL="2743242" indent="0">
-              <a:buNone/>
-              <a:defRPr sz="1600" b="1"/>
+            <a:lvl7pPr marL="1871960" indent="0">
+              <a:buNone/>
+              <a:defRPr sz="1092" b="1"/>
             </a:lvl7pPr>
-            <a:lvl8pPr marL="3200449" indent="0">
-              <a:buNone/>
-              <a:defRPr sz="1600" b="1"/>
+            <a:lvl8pPr marL="2183953" indent="0">
+              <a:buNone/>
+              <a:defRPr sz="1092" b="1"/>
             </a:lvl8pPr>
-            <a:lvl9pPr marL="3657656" indent="0">
-              <a:buNone/>
-              <a:defRPr sz="1600" b="1"/>
+            <a:lvl9pPr marL="2495946" indent="0">
+              <a:buNone/>
+              <a:defRPr sz="1092" b="1"/>
             </a:lvl9pPr>
           </a:lstStyle>
           <a:p>
@@ -1536,7 +1537,7 @@
       </p:sp>
       <p:sp>
         <p:nvSpPr>
-          <p:cNvPr id="6" name="Inhaltsplatzhalter 5"/>
+          <p:cNvPr id="6" name="Content Placeholder 5"/>
           <p:cNvSpPr>
             <a:spLocks noGrp="1"/>
           </p:cNvSpPr>
@@ -1546,8 +1547,8 @@
         </p:nvSpPr>
         <p:spPr>
           <a:xfrm>
-            <a:off x="6172200" y="2505075"/>
-            <a:ext cx="5183188" cy="3684588"/>
+            <a:off x="6172200" y="1709482"/>
+            <a:ext cx="5183188" cy="2514390"/>
           </a:xfrm>
         </p:spPr>
         <p:txBody>
@@ -1587,13 +1588,13 @@
               <a:rPr lang="de-DE" smtClean="0"/>
               <a:t>Fünfte Ebene</a:t>
             </a:r>
-            <a:endParaRPr lang="de-DE"/>
-          </a:p>
-        </p:txBody>
-      </p:sp>
-      <p:sp>
-        <p:nvSpPr>
-          <p:cNvPr id="7" name="Datumsplatzhalter 6"/>
+            <a:endParaRPr lang="en-US" dirty="0"/>
+          </a:p>
+        </p:txBody>
+      </p:sp>
+      <p:sp>
+        <p:nvSpPr>
+          <p:cNvPr id="7" name="Date Placeholder 6"/>
           <p:cNvSpPr>
             <a:spLocks noGrp="1"/>
           </p:cNvSpPr>
@@ -1608,7 +1609,7 @@
           <a:p>
             <a:fld id="{B7C59FFB-51EC-4DB4-A90A-AC9385E36DD4}" type="datetimeFigureOut">
               <a:rPr lang="de-DE" smtClean="0"/>
-              <a:t>13.02.2019</a:t>
+              <a:t>14.02.2019</a:t>
             </a:fld>
             <a:endParaRPr lang="de-DE"/>
           </a:p>
@@ -1616,7 +1617,7 @@
       </p:sp>
       <p:sp>
         <p:nvSpPr>
-          <p:cNvPr id="8" name="Fußzeilenplatzhalter 7"/>
+          <p:cNvPr id="8" name="Footer Placeholder 7"/>
           <p:cNvSpPr>
             <a:spLocks noGrp="1"/>
           </p:cNvSpPr>
@@ -1635,7 +1636,7 @@
       </p:sp>
       <p:sp>
         <p:nvSpPr>
-          <p:cNvPr id="9" name="Foliennummernplatzhalter 8"/>
+          <p:cNvPr id="9" name="Slide Number Placeholder 8"/>
           <p:cNvSpPr>
             <a:spLocks noGrp="1"/>
           </p:cNvSpPr>
@@ -1659,7 +1660,7 @@
     </p:spTree>
     <p:extLst>
       <p:ext uri="{BB962C8B-B14F-4D97-AF65-F5344CB8AC3E}">
-        <p14:creationId xmlns:p14="http://schemas.microsoft.com/office/powerpoint/2010/main" val="3007312577"/>
+        <p14:creationId xmlns:p14="http://schemas.microsoft.com/office/powerpoint/2010/main" val="3636116477"/>
       </p:ext>
     </p:extLst>
   </p:cSld>
@@ -1688,7 +1689,7 @@
       </p:grpSpPr>
       <p:sp>
         <p:nvSpPr>
-          <p:cNvPr id="2" name="Titel 1"/>
+          <p:cNvPr id="2" name="Title 1"/>
           <p:cNvSpPr>
             <a:spLocks noGrp="1"/>
           </p:cNvSpPr>
@@ -1705,13 +1706,13 @@
               <a:rPr lang="de-DE" smtClean="0"/>
               <a:t>Titelmasterformat durch Klicken bearbeiten</a:t>
             </a:r>
-            <a:endParaRPr lang="de-DE"/>
-          </a:p>
-        </p:txBody>
-      </p:sp>
-      <p:sp>
-        <p:nvSpPr>
-          <p:cNvPr id="3" name="Datumsplatzhalter 2"/>
+            <a:endParaRPr lang="en-US" dirty="0"/>
+          </a:p>
+        </p:txBody>
+      </p:sp>
+      <p:sp>
+        <p:nvSpPr>
+          <p:cNvPr id="3" name="Date Placeholder 2"/>
           <p:cNvSpPr>
             <a:spLocks noGrp="1"/>
           </p:cNvSpPr>
@@ -1726,7 +1727,7 @@
           <a:p>
             <a:fld id="{B7C59FFB-51EC-4DB4-A90A-AC9385E36DD4}" type="datetimeFigureOut">
               <a:rPr lang="de-DE" smtClean="0"/>
-              <a:t>13.02.2019</a:t>
+              <a:t>14.02.2019</a:t>
             </a:fld>
             <a:endParaRPr lang="de-DE"/>
           </a:p>
@@ -1734,7 +1735,7 @@
       </p:sp>
       <p:sp>
         <p:nvSpPr>
-          <p:cNvPr id="4" name="Fußzeilenplatzhalter 3"/>
+          <p:cNvPr id="4" name="Footer Placeholder 3"/>
           <p:cNvSpPr>
             <a:spLocks noGrp="1"/>
           </p:cNvSpPr>
@@ -1753,7 +1754,7 @@
       </p:sp>
       <p:sp>
         <p:nvSpPr>
-          <p:cNvPr id="5" name="Foliennummernplatzhalter 4"/>
+          <p:cNvPr id="5" name="Slide Number Placeholder 4"/>
           <p:cNvSpPr>
             <a:spLocks noGrp="1"/>
           </p:cNvSpPr>
@@ -1777,7 +1778,7 @@
     </p:spTree>
     <p:extLst>
       <p:ext uri="{BB962C8B-B14F-4D97-AF65-F5344CB8AC3E}">
-        <p14:creationId xmlns:p14="http://schemas.microsoft.com/office/powerpoint/2010/main" val="1245708643"/>
+        <p14:creationId xmlns:p14="http://schemas.microsoft.com/office/powerpoint/2010/main" val="2033931771"/>
       </p:ext>
     </p:extLst>
   </p:cSld>
@@ -1806,7 +1807,7 @@
       </p:grpSpPr>
       <p:sp>
         <p:nvSpPr>
-          <p:cNvPr id="2" name="Datumsplatzhalter 1"/>
+          <p:cNvPr id="2" name="Date Placeholder 1"/>
           <p:cNvSpPr>
             <a:spLocks noGrp="1"/>
           </p:cNvSpPr>
@@ -1821,7 +1822,7 @@
           <a:p>
             <a:fld id="{B7C59FFB-51EC-4DB4-A90A-AC9385E36DD4}" type="datetimeFigureOut">
               <a:rPr lang="de-DE" smtClean="0"/>
-              <a:t>13.02.2019</a:t>
+              <a:t>14.02.2019</a:t>
             </a:fld>
             <a:endParaRPr lang="de-DE"/>
           </a:p>
@@ -1829,7 +1830,7 @@
       </p:sp>
       <p:sp>
         <p:nvSpPr>
-          <p:cNvPr id="3" name="Fußzeilenplatzhalter 2"/>
+          <p:cNvPr id="3" name="Footer Placeholder 2"/>
           <p:cNvSpPr>
             <a:spLocks noGrp="1"/>
           </p:cNvSpPr>
@@ -1848,7 +1849,7 @@
       </p:sp>
       <p:sp>
         <p:nvSpPr>
-          <p:cNvPr id="4" name="Foliennummernplatzhalter 3"/>
+          <p:cNvPr id="4" name="Slide Number Placeholder 3"/>
           <p:cNvSpPr>
             <a:spLocks noGrp="1"/>
           </p:cNvSpPr>
@@ -1872,7 +1873,7 @@
     </p:spTree>
     <p:extLst>
       <p:ext uri="{BB962C8B-B14F-4D97-AF65-F5344CB8AC3E}">
-        <p14:creationId xmlns:p14="http://schemas.microsoft.com/office/powerpoint/2010/main" val="1503285403"/>
+        <p14:creationId xmlns:p14="http://schemas.microsoft.com/office/powerpoint/2010/main" val="72095322"/>
       </p:ext>
     </p:extLst>
   </p:cSld>
@@ -1901,7 +1902,7 @@
       </p:grpSpPr>
       <p:sp>
         <p:nvSpPr>
-          <p:cNvPr id="2" name="Titel 1"/>
+          <p:cNvPr id="2" name="Title 1"/>
           <p:cNvSpPr>
             <a:spLocks noGrp="1"/>
           </p:cNvSpPr>
@@ -1911,15 +1912,15 @@
         </p:nvSpPr>
         <p:spPr>
           <a:xfrm>
-            <a:off x="839788" y="457200"/>
-            <a:ext cx="3932237" cy="1600200"/>
+            <a:off x="839789" y="311997"/>
+            <a:ext cx="3932237" cy="1091988"/>
           </a:xfrm>
         </p:spPr>
         <p:txBody>
           <a:bodyPr anchor="b"/>
           <a:lstStyle>
             <a:lvl1pPr>
-              <a:defRPr sz="3200"/>
+              <a:defRPr sz="2184"/>
             </a:lvl1pPr>
           </a:lstStyle>
           <a:p>
@@ -1927,13 +1928,13 @@
               <a:rPr lang="de-DE" smtClean="0"/>
               <a:t>Titelmasterformat durch Klicken bearbeiten</a:t>
             </a:r>
-            <a:endParaRPr lang="de-DE"/>
-          </a:p>
-        </p:txBody>
-      </p:sp>
-      <p:sp>
-        <p:nvSpPr>
-          <p:cNvPr id="3" name="Inhaltsplatzhalter 2"/>
+            <a:endParaRPr lang="en-US" dirty="0"/>
+          </a:p>
+        </p:txBody>
+      </p:sp>
+      <p:sp>
+        <p:nvSpPr>
+          <p:cNvPr id="3" name="Content Placeholder 2"/>
           <p:cNvSpPr>
             <a:spLocks noGrp="1"/>
           </p:cNvSpPr>
@@ -1943,39 +1944,39 @@
         </p:nvSpPr>
         <p:spPr>
           <a:xfrm>
-            <a:off x="5183189" y="987427"/>
-            <a:ext cx="6172200" cy="4873625"/>
+            <a:off x="5183188" y="673826"/>
+            <a:ext cx="6172200" cy="3325798"/>
           </a:xfrm>
         </p:spPr>
         <p:txBody>
           <a:bodyPr/>
           <a:lstStyle>
             <a:lvl1pPr>
-              <a:defRPr sz="3200"/>
+              <a:defRPr sz="2184"/>
             </a:lvl1pPr>
             <a:lvl2pPr>
-              <a:defRPr sz="2800"/>
+              <a:defRPr sz="1911"/>
             </a:lvl2pPr>
             <a:lvl3pPr>
-              <a:defRPr sz="2400"/>
+              <a:defRPr sz="1638"/>
             </a:lvl3pPr>
             <a:lvl4pPr>
-              <a:defRPr sz="2000"/>
+              <a:defRPr sz="1365"/>
             </a:lvl4pPr>
             <a:lvl5pPr>
-              <a:defRPr sz="2000"/>
+              <a:defRPr sz="1365"/>
             </a:lvl5pPr>
             <a:lvl6pPr>
-              <a:defRPr sz="2000"/>
+              <a:defRPr sz="1365"/>
             </a:lvl6pPr>
             <a:lvl7pPr>
-              <a:defRPr sz="2000"/>
+              <a:defRPr sz="1365"/>
             </a:lvl7pPr>
             <a:lvl8pPr>
-              <a:defRPr sz="2000"/>
+              <a:defRPr sz="1365"/>
             </a:lvl8pPr>
             <a:lvl9pPr>
-              <a:defRPr sz="2000"/>
+              <a:defRPr sz="1365"/>
             </a:lvl9pPr>
           </a:lstStyle>
           <a:p>
@@ -2012,13 +2013,13 @@
               <a:rPr lang="de-DE" smtClean="0"/>
               <a:t>Fünfte Ebene</a:t>
             </a:r>
-            <a:endParaRPr lang="de-DE"/>
-          </a:p>
-        </p:txBody>
-      </p:sp>
-      <p:sp>
-        <p:nvSpPr>
-          <p:cNvPr id="4" name="Textplatzhalter 3"/>
+            <a:endParaRPr lang="en-US" dirty="0"/>
+          </a:p>
+        </p:txBody>
+      </p:sp>
+      <p:sp>
+        <p:nvSpPr>
+          <p:cNvPr id="4" name="Text Placeholder 3"/>
           <p:cNvSpPr>
             <a:spLocks noGrp="1"/>
           </p:cNvSpPr>
@@ -2028,8 +2029,8 @@
         </p:nvSpPr>
         <p:spPr>
           <a:xfrm>
-            <a:off x="839788" y="2057400"/>
-            <a:ext cx="3932237" cy="3811588"/>
+            <a:off x="839789" y="1403985"/>
+            <a:ext cx="3932237" cy="2601056"/>
           </a:xfrm>
         </p:spPr>
         <p:txBody>
@@ -2037,39 +2038,39 @@
           <a:lstStyle>
             <a:lvl1pPr marL="0" indent="0">
               <a:buNone/>
-              <a:defRPr sz="1600"/>
+              <a:defRPr sz="1092"/>
             </a:lvl1pPr>
-            <a:lvl2pPr marL="457207" indent="0">
-              <a:buNone/>
-              <a:defRPr sz="1400"/>
+            <a:lvl2pPr marL="311993" indent="0">
+              <a:buNone/>
+              <a:defRPr sz="955"/>
             </a:lvl2pPr>
-            <a:lvl3pPr marL="914414" indent="0">
-              <a:buNone/>
-              <a:defRPr sz="1200"/>
+            <a:lvl3pPr marL="623987" indent="0">
+              <a:buNone/>
+              <a:defRPr sz="819"/>
             </a:lvl3pPr>
-            <a:lvl4pPr marL="1371621" indent="0">
-              <a:buNone/>
-              <a:defRPr sz="1000"/>
+            <a:lvl4pPr marL="935980" indent="0">
+              <a:buNone/>
+              <a:defRPr sz="682"/>
             </a:lvl4pPr>
-            <a:lvl5pPr marL="1828828" indent="0">
-              <a:buNone/>
-              <a:defRPr sz="1000"/>
+            <a:lvl5pPr marL="1247973" indent="0">
+              <a:buNone/>
+              <a:defRPr sz="682"/>
             </a:lvl5pPr>
-            <a:lvl6pPr marL="2286035" indent="0">
-              <a:buNone/>
-              <a:defRPr sz="1000"/>
+            <a:lvl6pPr marL="1559966" indent="0">
+              <a:buNone/>
+              <a:defRPr sz="682"/>
             </a:lvl6pPr>
-            <a:lvl7pPr marL="2743242" indent="0">
-              <a:buNone/>
-              <a:defRPr sz="1000"/>
+            <a:lvl7pPr marL="1871960" indent="0">
+              <a:buNone/>
+              <a:defRPr sz="682"/>
             </a:lvl7pPr>
-            <a:lvl8pPr marL="3200449" indent="0">
-              <a:buNone/>
-              <a:defRPr sz="1000"/>
+            <a:lvl8pPr marL="2183953" indent="0">
+              <a:buNone/>
+              <a:defRPr sz="682"/>
             </a:lvl8pPr>
-            <a:lvl9pPr marL="3657656" indent="0">
-              <a:buNone/>
-              <a:defRPr sz="1000"/>
+            <a:lvl9pPr marL="2495946" indent="0">
+              <a:buNone/>
+              <a:defRPr sz="682"/>
             </a:lvl9pPr>
           </a:lstStyle>
           <a:p>
@@ -2083,7 +2084,7 @@
       </p:sp>
       <p:sp>
         <p:nvSpPr>
-          <p:cNvPr id="5" name="Datumsplatzhalter 4"/>
+          <p:cNvPr id="5" name="Date Placeholder 4"/>
           <p:cNvSpPr>
             <a:spLocks noGrp="1"/>
           </p:cNvSpPr>
@@ -2098,7 +2099,7 @@
           <a:p>
             <a:fld id="{B7C59FFB-51EC-4DB4-A90A-AC9385E36DD4}" type="datetimeFigureOut">
               <a:rPr lang="de-DE" smtClean="0"/>
-              <a:t>13.02.2019</a:t>
+              <a:t>14.02.2019</a:t>
             </a:fld>
             <a:endParaRPr lang="de-DE"/>
           </a:p>
@@ -2106,7 +2107,7 @@
       </p:sp>
       <p:sp>
         <p:nvSpPr>
-          <p:cNvPr id="6" name="Fußzeilenplatzhalter 5"/>
+          <p:cNvPr id="6" name="Footer Placeholder 5"/>
           <p:cNvSpPr>
             <a:spLocks noGrp="1"/>
           </p:cNvSpPr>
@@ -2125,7 +2126,7 @@
       </p:sp>
       <p:sp>
         <p:nvSpPr>
-          <p:cNvPr id="7" name="Foliennummernplatzhalter 6"/>
+          <p:cNvPr id="7" name="Slide Number Placeholder 6"/>
           <p:cNvSpPr>
             <a:spLocks noGrp="1"/>
           </p:cNvSpPr>
@@ -2149,7 +2150,7 @@
     </p:spTree>
     <p:extLst>
       <p:ext uri="{BB962C8B-B14F-4D97-AF65-F5344CB8AC3E}">
-        <p14:creationId xmlns:p14="http://schemas.microsoft.com/office/powerpoint/2010/main" val="1856714786"/>
+        <p14:creationId xmlns:p14="http://schemas.microsoft.com/office/powerpoint/2010/main" val="27017184"/>
       </p:ext>
     </p:extLst>
   </p:cSld>
@@ -2178,7 +2179,7 @@
       </p:grpSpPr>
       <p:sp>
         <p:nvSpPr>
-          <p:cNvPr id="2" name="Titel 1"/>
+          <p:cNvPr id="2" name="Title 1"/>
           <p:cNvSpPr>
             <a:spLocks noGrp="1"/>
           </p:cNvSpPr>
@@ -2188,15 +2189,15 @@
         </p:nvSpPr>
         <p:spPr>
           <a:xfrm>
-            <a:off x="839788" y="457200"/>
-            <a:ext cx="3932237" cy="1600200"/>
+            <a:off x="839789" y="311997"/>
+            <a:ext cx="3932237" cy="1091988"/>
           </a:xfrm>
         </p:spPr>
         <p:txBody>
           <a:bodyPr anchor="b"/>
           <a:lstStyle>
             <a:lvl1pPr>
-              <a:defRPr sz="3200"/>
+              <a:defRPr sz="2184"/>
             </a:lvl1pPr>
           </a:lstStyle>
           <a:p>
@@ -2204,15 +2205,15 @@
               <a:rPr lang="de-DE" smtClean="0"/>
               <a:t>Titelmasterformat durch Klicken bearbeiten</a:t>
             </a:r>
-            <a:endParaRPr lang="de-DE"/>
-          </a:p>
-        </p:txBody>
-      </p:sp>
-      <p:sp>
-        <p:nvSpPr>
-          <p:cNvPr id="3" name="Bildplatzhalter 2"/>
-          <p:cNvSpPr>
-            <a:spLocks noGrp="1"/>
+            <a:endParaRPr lang="en-US" dirty="0"/>
+          </a:p>
+        </p:txBody>
+      </p:sp>
+      <p:sp>
+        <p:nvSpPr>
+          <p:cNvPr id="3" name="Picture Placeholder 2"/>
+          <p:cNvSpPr>
+            <a:spLocks noGrp="1" noChangeAspect="1"/>
           </p:cNvSpPr>
           <p:nvPr>
             <p:ph type="pic" idx="1"/>
@@ -2220,8 +2221,73 @@
         </p:nvSpPr>
         <p:spPr>
           <a:xfrm>
-            <a:off x="5183189" y="987427"/>
-            <a:ext cx="6172200" cy="4873625"/>
+            <a:off x="5183188" y="673826"/>
+            <a:ext cx="6172200" cy="3325798"/>
+          </a:xfrm>
+        </p:spPr>
+        <p:txBody>
+          <a:bodyPr anchor="t"/>
+          <a:lstStyle>
+            <a:lvl1pPr marL="0" indent="0">
+              <a:buNone/>
+              <a:defRPr sz="2184"/>
+            </a:lvl1pPr>
+            <a:lvl2pPr marL="311993" indent="0">
+              <a:buNone/>
+              <a:defRPr sz="1911"/>
+            </a:lvl2pPr>
+            <a:lvl3pPr marL="623987" indent="0">
+              <a:buNone/>
+              <a:defRPr sz="1638"/>
+            </a:lvl3pPr>
+            <a:lvl4pPr marL="935980" indent="0">
+              <a:buNone/>
+              <a:defRPr sz="1365"/>
+            </a:lvl4pPr>
+            <a:lvl5pPr marL="1247973" indent="0">
+              <a:buNone/>
+              <a:defRPr sz="1365"/>
+            </a:lvl5pPr>
+            <a:lvl6pPr marL="1559966" indent="0">
+              <a:buNone/>
+              <a:defRPr sz="1365"/>
+            </a:lvl6pPr>
+            <a:lvl7pPr marL="1871960" indent="0">
+              <a:buNone/>
+              <a:defRPr sz="1365"/>
+            </a:lvl7pPr>
+            <a:lvl8pPr marL="2183953" indent="0">
+              <a:buNone/>
+              <a:defRPr sz="1365"/>
+            </a:lvl8pPr>
+            <a:lvl9pPr marL="2495946" indent="0">
+              <a:buNone/>
+              <a:defRPr sz="1365"/>
+            </a:lvl9pPr>
+          </a:lstStyle>
+          <a:p>
+            <a:r>
+              <a:rPr lang="de-DE" smtClean="0"/>
+              <a:t>Bild durch Klicken auf Symbol hinzufügen</a:t>
+            </a:r>
+            <a:endParaRPr lang="en-US" dirty="0"/>
+          </a:p>
+        </p:txBody>
+      </p:sp>
+      <p:sp>
+        <p:nvSpPr>
+          <p:cNvPr id="4" name="Text Placeholder 3"/>
+          <p:cNvSpPr>
+            <a:spLocks noGrp="1"/>
+          </p:cNvSpPr>
+          <p:nvPr>
+            <p:ph type="body" sz="half" idx="2"/>
+          </p:nvPr>
+        </p:nvSpPr>
+        <p:spPr>
+          <a:xfrm>
+            <a:off x="839789" y="1403985"/>
+            <a:ext cx="3932237" cy="2601056"/>
           </a:xfrm>
         </p:spPr>
         <p:txBody>
@@ -2229,119 +2295,81 @@
           <a:lstStyle>
             <a:lvl1pPr marL="0" indent="0">
               <a:buNone/>
-              <a:defRPr sz="3200"/>
+              <a:defRPr sz="1092"/>
             </a:lvl1pPr>
-            <a:lvl2pPr marL="457207" indent="0">
-              <a:buNone/>
-              <a:defRPr sz="2800"/>
+            <a:lvl2pPr marL="311993" indent="0">
+              <a:buNone/>
+              <a:defRPr sz="955"/>
             </a:lvl2pPr>
-            <a:lvl3pPr marL="914414" indent="0">
-              <a:buNone/>
-              <a:defRPr sz="2400"/>
+            <a:lvl3pPr marL="623987" indent="0">
+              <a:buNone/>
+              <a:defRPr sz="819"/>
             </a:lvl3pPr>
-            <a:lvl4pPr marL="1371621" indent="0">
-              <a:buNone/>
-              <a:defRPr sz="2000"/>
+            <a:lvl4pPr marL="935980" indent="0">
+              <a:buNone/>
+              <a:defRPr sz="682"/>
             </a:lvl4pPr>
-            <a:lvl5pPr marL="1828828" indent="0">
-              <a:buNone/>
-              <a:defRPr sz="2000"/>
+            <a:lvl5pPr marL="1247973" indent="0">
+              <a:buNone/>
+              <a:defRPr sz="682"/>
             </a:lvl5pPr>
-            <a:lvl6pPr marL="2286035" indent="0">
-              <a:buNone/>
-              <a:defRPr sz="2000"/>
+            <a:lvl6pPr marL="1559966" indent="0">
+              <a:buNone/>
+              <a:defRPr sz="682"/>
             </a:lvl6pPr>
-            <a:lvl7pPr marL="2743242" indent="0">
-              <a:buNone/>
-              <a:defRPr sz="2000"/>
+            <a:lvl7pPr marL="1871960" indent="0">
+              <a:buNone/>
+              <a:defRPr sz="682"/>
             </a:lvl7pPr>
-            <a:lvl8pPr marL="3200449" indent="0">
-              <a:buNone/>
-              <a:defRPr sz="2000"/>
+            <a:lvl8pPr marL="2183953" indent="0">
+              <a:buNone/>
+              <a:defRPr sz="682"/>
             </a:lvl8pPr>
-            <a:lvl9pPr marL="3657656" indent="0">
-              <a:buNone/>
-              <a:defRPr sz="2000"/>
+            <a:lvl9pPr marL="2495946" indent="0">
+              <a:buNone/>
+              <a:defRPr sz="682"/>
             </a:lvl9pPr>
           </a:lstStyle>
           <a:p>
-            <a:endParaRPr lang="de-DE"/>
-          </a:p>
-        </p:txBody>
-      </p:sp>
-      <p:sp>
-        <p:nvSpPr>
-          <p:cNvPr id="4" name="Textplatzhalter 3"/>
-          <p:cNvSpPr>
-            <a:spLocks noGrp="1"/>
-          </p:cNvSpPr>
-          <p:nvPr>
-            <p:ph type="body" sz="half" idx="2"/>
-          </p:nvPr>
-        </p:nvSpPr>
-        <p:spPr>
-          <a:xfrm>
-            <a:off x="839788" y="2057400"/>
-            <a:ext cx="3932237" cy="3811588"/>
-          </a:xfrm>
-        </p:spPr>
+            <a:pPr lvl="0"/>
+            <a:r>
+              <a:rPr lang="de-DE" smtClean="0"/>
+              <a:t>Formatvorlagen des Textmasters bearbeiten</a:t>
+            </a:r>
+          </a:p>
+        </p:txBody>
+      </p:sp>
+      <p:sp>
+        <p:nvSpPr>
+          <p:cNvPr id="5" name="Date Placeholder 4"/>
+          <p:cNvSpPr>
+            <a:spLocks noGrp="1"/>
+          </p:cNvSpPr>
+          <p:nvPr>
+            <p:ph type="dt" sz="half" idx="10"/>
+          </p:nvPr>
+        </p:nvSpPr>
+        <p:spPr/>
         <p:txBody>
           <a:bodyPr/>
-          <a:lstStyle>
-            <a:lvl1pPr marL="0" indent="0">
-              <a:buNone/>
-              <a:defRPr sz="1600"/>
-            </a:lvl1pPr>
-            <a:lvl2pPr marL="457207" indent="0">
-              <a:buNone/>
-              <a:defRPr sz="1400"/>
-            </a:lvl2pPr>
-            <a:lvl3pPr marL="914414" indent="0">
-              <a:buNone/>
-              <a:defRPr sz="1200"/>
-            </a:lvl3pPr>
-            <a:lvl4pPr marL="1371621" indent="0">
-              <a:buNone/>
-              <a:defRPr sz="1000"/>
-            </a:lvl4pPr>
-            <a:lvl5pPr marL="1828828" indent="0">
-              <a:buNone/>
-              <a:defRPr sz="1000"/>
-            </a:lvl5pPr>
-            <a:lvl6pPr marL="2286035" indent="0">
-              <a:buNone/>
-              <a:defRPr sz="1000"/>
-            </a:lvl6pPr>
-            <a:lvl7pPr marL="2743242" indent="0">
-              <a:buNone/>
-              <a:defRPr sz="1000"/>
-            </a:lvl7pPr>
-            <a:lvl8pPr marL="3200449" indent="0">
-              <a:buNone/>
-              <a:defRPr sz="1000"/>
-            </a:lvl8pPr>
-            <a:lvl9pPr marL="3657656" indent="0">
-              <a:buNone/>
-              <a:defRPr sz="1000"/>
-            </a:lvl9pPr>
-          </a:lstStyle>
-          <a:p>
-            <a:pPr lvl="0"/>
-            <a:r>
-              <a:rPr lang="de-DE" smtClean="0"/>
-              <a:t>Formatvorlagen des Textmasters bearbeiten</a:t>
-            </a:r>
-          </a:p>
-        </p:txBody>
-      </p:sp>
-      <p:sp>
-        <p:nvSpPr>
-          <p:cNvPr id="5" name="Datumsplatzhalter 4"/>
-          <p:cNvSpPr>
-            <a:spLocks noGrp="1"/>
-          </p:cNvSpPr>
-          <p:nvPr>
-            <p:ph type="dt" sz="half" idx="10"/>
+          <a:lstStyle/>
+          <a:p>
+            <a:fld id="{B7C59FFB-51EC-4DB4-A90A-AC9385E36DD4}" type="datetimeFigureOut">
+              <a:rPr lang="de-DE" smtClean="0"/>
+              <a:t>14.02.2019</a:t>
+            </a:fld>
+            <a:endParaRPr lang="de-DE"/>
+          </a:p>
+        </p:txBody>
+      </p:sp>
+      <p:sp>
+        <p:nvSpPr>
+          <p:cNvPr id="6" name="Footer Placeholder 5"/>
+          <p:cNvSpPr>
+            <a:spLocks noGrp="1"/>
+          </p:cNvSpPr>
+          <p:nvPr>
+            <p:ph type="ftr" sz="quarter" idx="11"/>
           </p:nvPr>
         </p:nvSpPr>
         <p:spPr/>
@@ -2349,36 +2377,13 @@
           <a:bodyPr/>
           <a:lstStyle/>
           <a:p>
-            <a:fld id="{B7C59FFB-51EC-4DB4-A90A-AC9385E36DD4}" type="datetimeFigureOut">
-              <a:rPr lang="de-DE" smtClean="0"/>
-              <a:t>13.02.2019</a:t>
-            </a:fld>
-            <a:endParaRPr lang="de-DE"/>
-          </a:p>
-        </p:txBody>
-      </p:sp>
-      <p:sp>
-        <p:nvSpPr>
-          <p:cNvPr id="6" name="Fußzeilenplatzhalter 5"/>
-          <p:cNvSpPr>
-            <a:spLocks noGrp="1"/>
-          </p:cNvSpPr>
-          <p:nvPr>
-            <p:ph type="ftr" sz="quarter" idx="11"/>
-          </p:nvPr>
-        </p:nvSpPr>
-        <p:spPr/>
-        <p:txBody>
-          <a:bodyPr/>
-          <a:lstStyle/>
-          <a:p>
-            <a:endParaRPr lang="de-DE"/>
-          </a:p>
-        </p:txBody>
-      </p:sp>
-      <p:sp>
-        <p:nvSpPr>
-          <p:cNvPr id="7" name="Foliennummernplatzhalter 6"/>
+            <a:endParaRPr lang="de-DE"/>
+          </a:p>
+        </p:txBody>
+      </p:sp>
+      <p:sp>
+        <p:nvSpPr>
+          <p:cNvPr id="7" name="Slide Number Placeholder 6"/>
           <p:cNvSpPr>
             <a:spLocks noGrp="1"/>
           </p:cNvSpPr>
@@ -2402,7 +2407,7 @@
     </p:spTree>
     <p:extLst>
       <p:ext uri="{BB962C8B-B14F-4D97-AF65-F5344CB8AC3E}">
-        <p14:creationId xmlns:p14="http://schemas.microsoft.com/office/powerpoint/2010/main" val="949480911"/>
+        <p14:creationId xmlns:p14="http://schemas.microsoft.com/office/powerpoint/2010/main" val="2058090271"/>
       </p:ext>
     </p:extLst>
   </p:cSld>
@@ -2436,7 +2441,7 @@
       </p:grpSpPr>
       <p:sp>
         <p:nvSpPr>
-          <p:cNvPr id="2" name="Titelplatzhalter 1"/>
+          <p:cNvPr id="2" name="Title Placeholder 1"/>
           <p:cNvSpPr>
             <a:spLocks noGrp="1"/>
           </p:cNvSpPr>
@@ -2446,8 +2451,8 @@
         </p:nvSpPr>
         <p:spPr>
           <a:xfrm>
-            <a:off x="838201" y="365127"/>
-            <a:ext cx="10515600" cy="1325563"/>
+            <a:off x="838200" y="249164"/>
+            <a:ext cx="10515600" cy="904574"/>
           </a:xfrm>
           <a:prstGeom prst="rect">
             <a:avLst/>
@@ -2463,13 +2468,13 @@
               <a:rPr lang="de-DE" smtClean="0"/>
               <a:t>Titelmasterformat durch Klicken bearbeiten</a:t>
             </a:r>
-            <a:endParaRPr lang="de-DE"/>
-          </a:p>
-        </p:txBody>
-      </p:sp>
-      <p:sp>
-        <p:nvSpPr>
-          <p:cNvPr id="3" name="Textplatzhalter 2"/>
+            <a:endParaRPr lang="en-US" dirty="0"/>
+          </a:p>
+        </p:txBody>
+      </p:sp>
+      <p:sp>
+        <p:nvSpPr>
+          <p:cNvPr id="3" name="Text Placeholder 2"/>
           <p:cNvSpPr>
             <a:spLocks noGrp="1"/>
           </p:cNvSpPr>
@@ -2479,8 +2484,8 @@
         </p:nvSpPr>
         <p:spPr>
           <a:xfrm>
-            <a:off x="838201" y="1825625"/>
-            <a:ext cx="10515600" cy="4351338"/>
+            <a:off x="838200" y="1245820"/>
+            <a:ext cx="10515600" cy="2969385"/>
           </a:xfrm>
           <a:prstGeom prst="rect">
             <a:avLst/>
@@ -2525,13 +2530,13 @@
               <a:rPr lang="de-DE" smtClean="0"/>
               <a:t>Fünfte Ebene</a:t>
             </a:r>
-            <a:endParaRPr lang="de-DE"/>
-          </a:p>
-        </p:txBody>
-      </p:sp>
-      <p:sp>
-        <p:nvSpPr>
-          <p:cNvPr id="4" name="Datumsplatzhalter 3"/>
+            <a:endParaRPr lang="en-US" dirty="0"/>
+          </a:p>
+        </p:txBody>
+      </p:sp>
+      <p:sp>
+        <p:nvSpPr>
+          <p:cNvPr id="4" name="Date Placeholder 3"/>
           <p:cNvSpPr>
             <a:spLocks noGrp="1"/>
           </p:cNvSpPr>
@@ -2541,8 +2546,8 @@
         </p:nvSpPr>
         <p:spPr>
           <a:xfrm>
-            <a:off x="838200" y="6356352"/>
-            <a:ext cx="2743200" cy="365125"/>
+            <a:off x="838200" y="4337621"/>
+            <a:ext cx="2743200" cy="249164"/>
           </a:xfrm>
           <a:prstGeom prst="rect">
             <a:avLst/>
@@ -2552,7 +2557,7 @@
           <a:bodyPr vert="horz" lIns="91440" tIns="45720" rIns="91440" bIns="45720" rtlCol="0" anchor="ctr"/>
           <a:lstStyle>
             <a:lvl1pPr algn="l">
-              <a:defRPr sz="1200">
+              <a:defRPr sz="819">
                 <a:solidFill>
                   <a:schemeClr val="tx1">
                     <a:tint val="75000"/>
@@ -2564,7 +2569,7 @@
           <a:p>
             <a:fld id="{B7C59FFB-51EC-4DB4-A90A-AC9385E36DD4}" type="datetimeFigureOut">
               <a:rPr lang="de-DE" smtClean="0"/>
-              <a:t>13.02.2019</a:t>
+              <a:t>14.02.2019</a:t>
             </a:fld>
             <a:endParaRPr lang="de-DE"/>
           </a:p>
@@ -2572,7 +2577,7 @@
       </p:sp>
       <p:sp>
         <p:nvSpPr>
-          <p:cNvPr id="5" name="Fußzeilenplatzhalter 4"/>
+          <p:cNvPr id="5" name="Footer Placeholder 4"/>
           <p:cNvSpPr>
             <a:spLocks noGrp="1"/>
           </p:cNvSpPr>
@@ -2582,8 +2587,8 @@
         </p:nvSpPr>
         <p:spPr>
           <a:xfrm>
-            <a:off x="4038601" y="6356352"/>
-            <a:ext cx="4114800" cy="365125"/>
+            <a:off x="4038600" y="4337621"/>
+            <a:ext cx="4114800" cy="249164"/>
           </a:xfrm>
           <a:prstGeom prst="rect">
             <a:avLst/>
@@ -2593,7 +2598,7 @@
           <a:bodyPr vert="horz" lIns="91440" tIns="45720" rIns="91440" bIns="45720" rtlCol="0" anchor="ctr"/>
           <a:lstStyle>
             <a:lvl1pPr algn="ctr">
-              <a:defRPr sz="1200">
+              <a:defRPr sz="819">
                 <a:solidFill>
                   <a:schemeClr val="tx1">
                     <a:tint val="75000"/>
@@ -2609,7 +2614,7 @@
       </p:sp>
       <p:sp>
         <p:nvSpPr>
-          <p:cNvPr id="6" name="Foliennummernplatzhalter 5"/>
+          <p:cNvPr id="6" name="Slide Number Placeholder 5"/>
           <p:cNvSpPr>
             <a:spLocks noGrp="1"/>
           </p:cNvSpPr>
@@ -2619,8 +2624,8 @@
         </p:nvSpPr>
         <p:spPr>
           <a:xfrm>
-            <a:off x="8610600" y="6356352"/>
-            <a:ext cx="2743200" cy="365125"/>
+            <a:off x="8610600" y="4337621"/>
+            <a:ext cx="2743200" cy="249164"/>
           </a:xfrm>
           <a:prstGeom prst="rect">
             <a:avLst/>
@@ -2630,7 +2635,7 @@
           <a:bodyPr vert="horz" lIns="91440" tIns="45720" rIns="91440" bIns="45720" rtlCol="0" anchor="ctr"/>
           <a:lstStyle>
             <a:lvl1pPr algn="r">
-              <a:defRPr sz="1200">
+              <a:defRPr sz="819">
                 <a:solidFill>
                   <a:schemeClr val="tx1">
                     <a:tint val="75000"/>
@@ -2651,27 +2656,27 @@
     </p:spTree>
     <p:extLst>
       <p:ext uri="{BB962C8B-B14F-4D97-AF65-F5344CB8AC3E}">
-        <p14:creationId xmlns:p14="http://schemas.microsoft.com/office/powerpoint/2010/main" val="238426636"/>
+        <p14:creationId xmlns:p14="http://schemas.microsoft.com/office/powerpoint/2010/main" val="392742281"/>
       </p:ext>
     </p:extLst>
   </p:cSld>
   <p:clrMap bg1="lt1" tx1="dk1" bg2="lt2" tx2="dk2" accent1="accent1" accent2="accent2" accent3="accent3" accent4="accent4" accent5="accent5" accent6="accent6" hlink="hlink" folHlink="folHlink"/>
   <p:sldLayoutIdLst>
-    <p:sldLayoutId id="2147483649" r:id="rId1"/>
-    <p:sldLayoutId id="2147483650" r:id="rId2"/>
-    <p:sldLayoutId id="2147483651" r:id="rId3"/>
-    <p:sldLayoutId id="2147483652" r:id="rId4"/>
-    <p:sldLayoutId id="2147483653" r:id="rId5"/>
-    <p:sldLayoutId id="2147483654" r:id="rId6"/>
-    <p:sldLayoutId id="2147483655" r:id="rId7"/>
-    <p:sldLayoutId id="2147483656" r:id="rId8"/>
-    <p:sldLayoutId id="2147483657" r:id="rId9"/>
-    <p:sldLayoutId id="2147483658" r:id="rId10"/>
-    <p:sldLayoutId id="2147483659" r:id="rId11"/>
+    <p:sldLayoutId id="2147483661" r:id="rId1"/>
+    <p:sldLayoutId id="2147483662" r:id="rId2"/>
+    <p:sldLayoutId id="2147483663" r:id="rId3"/>
+    <p:sldLayoutId id="2147483664" r:id="rId4"/>
+    <p:sldLayoutId id="2147483665" r:id="rId5"/>
+    <p:sldLayoutId id="2147483666" r:id="rId6"/>
+    <p:sldLayoutId id="2147483667" r:id="rId7"/>
+    <p:sldLayoutId id="2147483668" r:id="rId8"/>
+    <p:sldLayoutId id="2147483669" r:id="rId9"/>
+    <p:sldLayoutId id="2147483670" r:id="rId10"/>
+    <p:sldLayoutId id="2147483671" r:id="rId11"/>
   </p:sldLayoutIdLst>
   <p:txStyles>
     <p:titleStyle>
-      <a:lvl1pPr algn="l" defTabSz="914414" rtl="0" eaLnBrk="1" latinLnBrk="0" hangingPunct="1">
+      <a:lvl1pPr algn="l" defTabSz="623987" rtl="0" eaLnBrk="1" latinLnBrk="0" hangingPunct="1">
         <a:lnSpc>
           <a:spcPct val="90000"/>
         </a:lnSpc>
@@ -2679,7 +2684,7 @@
           <a:spcPct val="0"/>
         </a:spcBef>
         <a:buNone/>
-        <a:defRPr sz="4400" kern="1200">
+        <a:defRPr sz="3003" kern="1200">
           <a:solidFill>
             <a:schemeClr val="tx1"/>
           </a:solidFill>
@@ -2690,16 +2695,16 @@
       </a:lvl1pPr>
     </p:titleStyle>
     <p:bodyStyle>
-      <a:lvl1pPr marL="228603" indent="-228603" algn="l" defTabSz="914414" rtl="0" eaLnBrk="1" latinLnBrk="0" hangingPunct="1">
+      <a:lvl1pPr marL="155997" indent="-155997" algn="l" defTabSz="623987" rtl="0" eaLnBrk="1" latinLnBrk="0" hangingPunct="1">
         <a:lnSpc>
           <a:spcPct val="90000"/>
         </a:lnSpc>
         <a:spcBef>
-          <a:spcPts val="1000"/>
+          <a:spcPts val="682"/>
         </a:spcBef>
         <a:buFont typeface="Arial" panose="020B0604020202020204" pitchFamily="34" charset="0"/>
         <a:buChar char="•"/>
-        <a:defRPr sz="2800" kern="1200">
+        <a:defRPr sz="1911" kern="1200">
           <a:solidFill>
             <a:schemeClr val="tx1"/>
           </a:solidFill>
@@ -2708,16 +2713,16 @@
           <a:cs typeface="+mn-cs"/>
         </a:defRPr>
       </a:lvl1pPr>
-      <a:lvl2pPr marL="685810" indent="-228603" algn="l" defTabSz="914414" rtl="0" eaLnBrk="1" latinLnBrk="0" hangingPunct="1">
+      <a:lvl2pPr marL="467990" indent="-155997" algn="l" defTabSz="623987" rtl="0" eaLnBrk="1" latinLnBrk="0" hangingPunct="1">
         <a:lnSpc>
           <a:spcPct val="90000"/>
         </a:lnSpc>
         <a:spcBef>
-          <a:spcPts val="500"/>
+          <a:spcPts val="341"/>
         </a:spcBef>
         <a:buFont typeface="Arial" panose="020B0604020202020204" pitchFamily="34" charset="0"/>
         <a:buChar char="•"/>
-        <a:defRPr sz="2400" kern="1200">
+        <a:defRPr sz="1638" kern="1200">
           <a:solidFill>
             <a:schemeClr val="tx1"/>
           </a:solidFill>
@@ -2726,16 +2731,16 @@
           <a:cs typeface="+mn-cs"/>
         </a:defRPr>
       </a:lvl2pPr>
-      <a:lvl3pPr marL="1143017" indent="-228603" algn="l" defTabSz="914414" rtl="0" eaLnBrk="1" latinLnBrk="0" hangingPunct="1">
+      <a:lvl3pPr marL="779983" indent="-155997" algn="l" defTabSz="623987" rtl="0" eaLnBrk="1" latinLnBrk="0" hangingPunct="1">
         <a:lnSpc>
           <a:spcPct val="90000"/>
         </a:lnSpc>
         <a:spcBef>
-          <a:spcPts val="500"/>
+          <a:spcPts val="341"/>
         </a:spcBef>
         <a:buFont typeface="Arial" panose="020B0604020202020204" pitchFamily="34" charset="0"/>
         <a:buChar char="•"/>
-        <a:defRPr sz="2000" kern="1200">
+        <a:defRPr sz="1365" kern="1200">
           <a:solidFill>
             <a:schemeClr val="tx1"/>
           </a:solidFill>
@@ -2744,16 +2749,16 @@
           <a:cs typeface="+mn-cs"/>
         </a:defRPr>
       </a:lvl3pPr>
-      <a:lvl4pPr marL="1600224" indent="-228603" algn="l" defTabSz="914414" rtl="0" eaLnBrk="1" latinLnBrk="0" hangingPunct="1">
+      <a:lvl4pPr marL="1091976" indent="-155997" algn="l" defTabSz="623987" rtl="0" eaLnBrk="1" latinLnBrk="0" hangingPunct="1">
         <a:lnSpc>
           <a:spcPct val="90000"/>
         </a:lnSpc>
         <a:spcBef>
-          <a:spcPts val="500"/>
+          <a:spcPts val="341"/>
         </a:spcBef>
         <a:buFont typeface="Arial" panose="020B0604020202020204" pitchFamily="34" charset="0"/>
         <a:buChar char="•"/>
-        <a:defRPr sz="1800" kern="1200">
+        <a:defRPr sz="1228" kern="1200">
           <a:solidFill>
             <a:schemeClr val="tx1"/>
           </a:solidFill>
@@ -2762,16 +2767,16 @@
           <a:cs typeface="+mn-cs"/>
         </a:defRPr>
       </a:lvl4pPr>
-      <a:lvl5pPr marL="2057431" indent="-228603" algn="l" defTabSz="914414" rtl="0" eaLnBrk="1" latinLnBrk="0" hangingPunct="1">
+      <a:lvl5pPr marL="1403970" indent="-155997" algn="l" defTabSz="623987" rtl="0" eaLnBrk="1" latinLnBrk="0" hangingPunct="1">
         <a:lnSpc>
           <a:spcPct val="90000"/>
         </a:lnSpc>
         <a:spcBef>
-          <a:spcPts val="500"/>
+          <a:spcPts val="341"/>
         </a:spcBef>
         <a:buFont typeface="Arial" panose="020B0604020202020204" pitchFamily="34" charset="0"/>
         <a:buChar char="•"/>
-        <a:defRPr sz="1800" kern="1200">
+        <a:defRPr sz="1228" kern="1200">
           <a:solidFill>
             <a:schemeClr val="tx1"/>
           </a:solidFill>
@@ -2780,16 +2785,16 @@
           <a:cs typeface="+mn-cs"/>
         </a:defRPr>
       </a:lvl5pPr>
-      <a:lvl6pPr marL="2514638" indent="-228603" algn="l" defTabSz="914414" rtl="0" eaLnBrk="1" latinLnBrk="0" hangingPunct="1">
+      <a:lvl6pPr marL="1715963" indent="-155997" algn="l" defTabSz="623987" rtl="0" eaLnBrk="1" latinLnBrk="0" hangingPunct="1">
         <a:lnSpc>
           <a:spcPct val="90000"/>
         </a:lnSpc>
         <a:spcBef>
-          <a:spcPts val="500"/>
+          <a:spcPts val="341"/>
         </a:spcBef>
         <a:buFont typeface="Arial" panose="020B0604020202020204" pitchFamily="34" charset="0"/>
         <a:buChar char="•"/>
-        <a:defRPr sz="1800" kern="1200">
+        <a:defRPr sz="1228" kern="1200">
           <a:solidFill>
             <a:schemeClr val="tx1"/>
           </a:solidFill>
@@ -2798,16 +2803,16 @@
           <a:cs typeface="+mn-cs"/>
         </a:defRPr>
       </a:lvl6pPr>
-      <a:lvl7pPr marL="2971845" indent="-228603" algn="l" defTabSz="914414" rtl="0" eaLnBrk="1" latinLnBrk="0" hangingPunct="1">
+      <a:lvl7pPr marL="2027956" indent="-155997" algn="l" defTabSz="623987" rtl="0" eaLnBrk="1" latinLnBrk="0" hangingPunct="1">
         <a:lnSpc>
           <a:spcPct val="90000"/>
         </a:lnSpc>
         <a:spcBef>
-          <a:spcPts val="500"/>
+          <a:spcPts val="341"/>
         </a:spcBef>
         <a:buFont typeface="Arial" panose="020B0604020202020204" pitchFamily="34" charset="0"/>
         <a:buChar char="•"/>
-        <a:defRPr sz="1800" kern="1200">
+        <a:defRPr sz="1228" kern="1200">
           <a:solidFill>
             <a:schemeClr val="tx1"/>
           </a:solidFill>
@@ -2816,16 +2821,16 @@
           <a:cs typeface="+mn-cs"/>
         </a:defRPr>
       </a:lvl7pPr>
-      <a:lvl8pPr marL="3429052" indent="-228603" algn="l" defTabSz="914414" rtl="0" eaLnBrk="1" latinLnBrk="0" hangingPunct="1">
+      <a:lvl8pPr marL="2339950" indent="-155997" algn="l" defTabSz="623987" rtl="0" eaLnBrk="1" latinLnBrk="0" hangingPunct="1">
         <a:lnSpc>
           <a:spcPct val="90000"/>
         </a:lnSpc>
         <a:spcBef>
-          <a:spcPts val="500"/>
+          <a:spcPts val="341"/>
         </a:spcBef>
         <a:buFont typeface="Arial" panose="020B0604020202020204" pitchFamily="34" charset="0"/>
         <a:buChar char="•"/>
-        <a:defRPr sz="1800" kern="1200">
+        <a:defRPr sz="1228" kern="1200">
           <a:solidFill>
             <a:schemeClr val="tx1"/>
           </a:solidFill>
@@ -2834,16 +2839,16 @@
           <a:cs typeface="+mn-cs"/>
         </a:defRPr>
       </a:lvl8pPr>
-      <a:lvl9pPr marL="3886259" indent="-228603" algn="l" defTabSz="914414" rtl="0" eaLnBrk="1" latinLnBrk="0" hangingPunct="1">
+      <a:lvl9pPr marL="2651943" indent="-155997" algn="l" defTabSz="623987" rtl="0" eaLnBrk="1" latinLnBrk="0" hangingPunct="1">
         <a:lnSpc>
           <a:spcPct val="90000"/>
         </a:lnSpc>
         <a:spcBef>
-          <a:spcPts val="500"/>
+          <a:spcPts val="341"/>
         </a:spcBef>
         <a:buFont typeface="Arial" panose="020B0604020202020204" pitchFamily="34" charset="0"/>
         <a:buChar char="•"/>
-        <a:defRPr sz="1800" kern="1200">
+        <a:defRPr sz="1228" kern="1200">
           <a:solidFill>
             <a:schemeClr val="tx1"/>
           </a:solidFill>
@@ -2855,10 +2860,10 @@
     </p:bodyStyle>
     <p:otherStyle>
       <a:defPPr>
-        <a:defRPr lang="de-DE"/>
+        <a:defRPr lang="en-US"/>
       </a:defPPr>
-      <a:lvl1pPr marL="0" algn="l" defTabSz="914414" rtl="0" eaLnBrk="1" latinLnBrk="0" hangingPunct="1">
-        <a:defRPr sz="1800" kern="1200">
+      <a:lvl1pPr marL="0" algn="l" defTabSz="623987" rtl="0" eaLnBrk="1" latinLnBrk="0" hangingPunct="1">
+        <a:defRPr sz="1228" kern="1200">
           <a:solidFill>
             <a:schemeClr val="tx1"/>
           </a:solidFill>
@@ -2867,8 +2872,8 @@
           <a:cs typeface="+mn-cs"/>
         </a:defRPr>
       </a:lvl1pPr>
-      <a:lvl2pPr marL="457207" algn="l" defTabSz="914414" rtl="0" eaLnBrk="1" latinLnBrk="0" hangingPunct="1">
-        <a:defRPr sz="1800" kern="1200">
+      <a:lvl2pPr marL="311993" algn="l" defTabSz="623987" rtl="0" eaLnBrk="1" latinLnBrk="0" hangingPunct="1">
+        <a:defRPr sz="1228" kern="1200">
           <a:solidFill>
             <a:schemeClr val="tx1"/>
           </a:solidFill>
@@ -2877,8 +2882,8 @@
           <a:cs typeface="+mn-cs"/>
         </a:defRPr>
       </a:lvl2pPr>
-      <a:lvl3pPr marL="914414" algn="l" defTabSz="914414" rtl="0" eaLnBrk="1" latinLnBrk="0" hangingPunct="1">
-        <a:defRPr sz="1800" kern="1200">
+      <a:lvl3pPr marL="623987" algn="l" defTabSz="623987" rtl="0" eaLnBrk="1" latinLnBrk="0" hangingPunct="1">
+        <a:defRPr sz="1228" kern="1200">
           <a:solidFill>
             <a:schemeClr val="tx1"/>
           </a:solidFill>
@@ -2887,8 +2892,8 @@
           <a:cs typeface="+mn-cs"/>
         </a:defRPr>
       </a:lvl3pPr>
-      <a:lvl4pPr marL="1371621" algn="l" defTabSz="914414" rtl="0" eaLnBrk="1" latinLnBrk="0" hangingPunct="1">
-        <a:defRPr sz="1800" kern="1200">
+      <a:lvl4pPr marL="935980" algn="l" defTabSz="623987" rtl="0" eaLnBrk="1" latinLnBrk="0" hangingPunct="1">
+        <a:defRPr sz="1228" kern="1200">
           <a:solidFill>
             <a:schemeClr val="tx1"/>
           </a:solidFill>
@@ -2897,8 +2902,8 @@
           <a:cs typeface="+mn-cs"/>
         </a:defRPr>
       </a:lvl4pPr>
-      <a:lvl5pPr marL="1828828" algn="l" defTabSz="914414" rtl="0" eaLnBrk="1" latinLnBrk="0" hangingPunct="1">
-        <a:defRPr sz="1800" kern="1200">
+      <a:lvl5pPr marL="1247973" algn="l" defTabSz="623987" rtl="0" eaLnBrk="1" latinLnBrk="0" hangingPunct="1">
+        <a:defRPr sz="1228" kern="1200">
           <a:solidFill>
             <a:schemeClr val="tx1"/>
           </a:solidFill>
@@ -2907,8 +2912,8 @@
           <a:cs typeface="+mn-cs"/>
         </a:defRPr>
       </a:lvl5pPr>
-      <a:lvl6pPr marL="2286035" algn="l" defTabSz="914414" rtl="0" eaLnBrk="1" latinLnBrk="0" hangingPunct="1">
-        <a:defRPr sz="1800" kern="1200">
+      <a:lvl6pPr marL="1559966" algn="l" defTabSz="623987" rtl="0" eaLnBrk="1" latinLnBrk="0" hangingPunct="1">
+        <a:defRPr sz="1228" kern="1200">
           <a:solidFill>
             <a:schemeClr val="tx1"/>
           </a:solidFill>
@@ -2917,8 +2922,8 @@
           <a:cs typeface="+mn-cs"/>
         </a:defRPr>
       </a:lvl6pPr>
-      <a:lvl7pPr marL="2743242" algn="l" defTabSz="914414" rtl="0" eaLnBrk="1" latinLnBrk="0" hangingPunct="1">
-        <a:defRPr sz="1800" kern="1200">
+      <a:lvl7pPr marL="1871960" algn="l" defTabSz="623987" rtl="0" eaLnBrk="1" latinLnBrk="0" hangingPunct="1">
+        <a:defRPr sz="1228" kern="1200">
           <a:solidFill>
             <a:schemeClr val="tx1"/>
           </a:solidFill>
@@ -2927,8 +2932,8 @@
           <a:cs typeface="+mn-cs"/>
         </a:defRPr>
       </a:lvl7pPr>
-      <a:lvl8pPr marL="3200449" algn="l" defTabSz="914414" rtl="0" eaLnBrk="1" latinLnBrk="0" hangingPunct="1">
-        <a:defRPr sz="1800" kern="1200">
+      <a:lvl8pPr marL="2183953" algn="l" defTabSz="623987" rtl="0" eaLnBrk="1" latinLnBrk="0" hangingPunct="1">
+        <a:defRPr sz="1228" kern="1200">
           <a:solidFill>
             <a:schemeClr val="tx1"/>
           </a:solidFill>
@@ -2937,8 +2942,8 @@
           <a:cs typeface="+mn-cs"/>
         </a:defRPr>
       </a:lvl8pPr>
-      <a:lvl9pPr marL="3657656" algn="l" defTabSz="914414" rtl="0" eaLnBrk="1" latinLnBrk="0" hangingPunct="1">
-        <a:defRPr sz="1800" kern="1200">
+      <a:lvl9pPr marL="2495946" algn="l" defTabSz="623987" rtl="0" eaLnBrk="1" latinLnBrk="0" hangingPunct="1">
+        <a:defRPr sz="1228" kern="1200">
           <a:solidFill>
             <a:schemeClr val="tx1"/>
           </a:solidFill>
@@ -2985,7 +2990,7 @@
         </p:nvSpPr>
         <p:spPr>
           <a:xfrm>
-            <a:off x="6257904" y="1372110"/>
+            <a:off x="6263774" y="1396905"/>
             <a:ext cx="1375501" cy="2478866"/>
           </a:xfrm>
           <a:prstGeom prst="roundRect">
@@ -3029,7 +3034,7 @@
         </p:nvGrpSpPr>
         <p:grpSpPr>
           <a:xfrm>
-            <a:off x="26429" y="0"/>
+            <a:off x="32299" y="24795"/>
             <a:ext cx="5707903" cy="2005908"/>
             <a:chOff x="1162821" y="1252409"/>
             <a:chExt cx="4183656" cy="1427363"/>
@@ -3171,7 +3176,7 @@
         </p:nvGrpSpPr>
         <p:grpSpPr>
           <a:xfrm>
-            <a:off x="26430" y="2611543"/>
+            <a:off x="32299" y="2636338"/>
             <a:ext cx="5707902" cy="2005908"/>
             <a:chOff x="1162822" y="3108563"/>
             <a:chExt cx="4183655" cy="1427363"/>
@@ -3314,7 +3319,7 @@
         </p:nvGrpSpPr>
         <p:grpSpPr>
           <a:xfrm>
-            <a:off x="6707063" y="1356839"/>
+            <a:off x="6712932" y="1381634"/>
             <a:ext cx="5450790" cy="2005908"/>
             <a:chOff x="6840698" y="2335315"/>
             <a:chExt cx="3995203" cy="1427363"/>
@@ -3444,7 +3449,7 @@
         </p:nvCxnSpPr>
         <p:spPr>
           <a:xfrm>
-            <a:off x="5734332" y="1259403"/>
+            <a:off x="5740201" y="1284198"/>
             <a:ext cx="523572" cy="1352140"/>
           </a:xfrm>
           <a:prstGeom prst="line">
@@ -3482,7 +3487,7 @@
         </p:nvCxnSpPr>
         <p:spPr>
           <a:xfrm flipV="1">
-            <a:off x="5734332" y="2611543"/>
+            <a:off x="5740201" y="2636339"/>
             <a:ext cx="523572" cy="1259403"/>
           </a:xfrm>
           <a:prstGeom prst="line">
@@ -3520,7 +3525,7 @@
         </p:nvCxnSpPr>
         <p:spPr>
           <a:xfrm>
-            <a:off x="6257904" y="2611543"/>
+            <a:off x="6263774" y="2636339"/>
             <a:ext cx="449159" cy="4699"/>
           </a:xfrm>
           <a:prstGeom prst="line">
@@ -3566,6 +3571,1350 @@
       </p:par>
     </p:tnLst>
   </p:timing>
+</p:sld>
+</file>
+
+<file path=ppt/slides/slide2.xml><?xml version="1.0" encoding="utf-8"?>
+<p:sld xmlns:a="http://schemas.openxmlformats.org/drawingml/2006/main" xmlns:r="http://schemas.openxmlformats.org/officeDocument/2006/relationships" xmlns:p="http://schemas.openxmlformats.org/presentationml/2006/main">
+  <p:cSld>
+    <p:bg>
+      <p:bgPr>
+        <a:solidFill>
+          <a:srgbClr val="FFFFFF"/>
+        </a:solidFill>
+        <a:effectLst/>
+      </p:bgPr>
+    </p:bg>
+    <p:spTree>
+      <p:nvGrpSpPr>
+        <p:cNvPr id="1" name=""/>
+        <p:cNvGrpSpPr/>
+        <p:nvPr/>
+      </p:nvGrpSpPr>
+      <p:grpSpPr>
+        <a:xfrm>
+          <a:off x="0" y="0"/>
+          <a:ext cx="0" cy="0"/>
+          <a:chOff x="0" y="0"/>
+          <a:chExt cx="0" cy="0"/>
+        </a:xfrm>
+      </p:grpSpPr>
+      <p:sp>
+        <p:nvSpPr>
+          <p:cNvPr id="4" name="Rechteck 3"/>
+          <p:cNvSpPr/>
+          <p:nvPr/>
+        </p:nvSpPr>
+        <p:spPr>
+          <a:xfrm>
+            <a:off x="730577" y="650449"/>
+            <a:ext cx="1018095" cy="1018095"/>
+          </a:xfrm>
+          <a:prstGeom prst="rect">
+            <a:avLst/>
+          </a:prstGeom>
+          <a:solidFill>
+            <a:srgbClr val="A51E37">
+              <a:alpha val="50196"/>
+            </a:srgbClr>
+          </a:solidFill>
+          <a:ln>
+            <a:noFill/>
+          </a:ln>
+        </p:spPr>
+        <p:style>
+          <a:lnRef idx="2">
+            <a:schemeClr val="accent1">
+              <a:shade val="50000"/>
+            </a:schemeClr>
+          </a:lnRef>
+          <a:fillRef idx="1">
+            <a:schemeClr val="accent1"/>
+          </a:fillRef>
+          <a:effectRef idx="0">
+            <a:schemeClr val="accent1"/>
+          </a:effectRef>
+          <a:fontRef idx="minor">
+            <a:schemeClr val="lt1"/>
+          </a:fontRef>
+        </p:style>
+        <p:txBody>
+          <a:bodyPr rtlCol="0" anchor="ctr"/>
+          <a:lstStyle/>
+          <a:p>
+            <a:pPr algn="ctr"/>
+            <a:endParaRPr lang="de-DE"/>
+          </a:p>
+        </p:txBody>
+      </p:sp>
+      <p:sp>
+        <p:nvSpPr>
+          <p:cNvPr id="5" name="Rechteck 4"/>
+          <p:cNvSpPr/>
+          <p:nvPr/>
+        </p:nvSpPr>
+        <p:spPr>
+          <a:xfrm>
+            <a:off x="2023620" y="2050330"/>
+            <a:ext cx="1018095" cy="1018095"/>
+          </a:xfrm>
+          <a:prstGeom prst="rect">
+            <a:avLst/>
+          </a:prstGeom>
+          <a:solidFill>
+            <a:schemeClr val="accent4">
+              <a:alpha val="50196"/>
+            </a:schemeClr>
+          </a:solidFill>
+          <a:ln>
+            <a:noFill/>
+          </a:ln>
+        </p:spPr>
+        <p:style>
+          <a:lnRef idx="2">
+            <a:schemeClr val="accent1">
+              <a:shade val="50000"/>
+            </a:schemeClr>
+          </a:lnRef>
+          <a:fillRef idx="1">
+            <a:schemeClr val="accent1"/>
+          </a:fillRef>
+          <a:effectRef idx="0">
+            <a:schemeClr val="accent1"/>
+          </a:effectRef>
+          <a:fontRef idx="minor">
+            <a:schemeClr val="lt1"/>
+          </a:fontRef>
+        </p:style>
+        <p:txBody>
+          <a:bodyPr rtlCol="0" anchor="ctr"/>
+          <a:lstStyle/>
+          <a:p>
+            <a:pPr algn="ctr"/>
+            <a:endParaRPr lang="de-DE"/>
+          </a:p>
+        </p:txBody>
+      </p:sp>
+      <p:sp>
+        <p:nvSpPr>
+          <p:cNvPr id="6" name="Rechteck 5"/>
+          <p:cNvSpPr/>
+          <p:nvPr/>
+        </p:nvSpPr>
+        <p:spPr>
+          <a:xfrm>
+            <a:off x="2023620" y="650449"/>
+            <a:ext cx="1018095" cy="1018095"/>
+          </a:xfrm>
+          <a:prstGeom prst="rect">
+            <a:avLst/>
+          </a:prstGeom>
+          <a:solidFill>
+            <a:srgbClr val="A51E37">
+              <a:alpha val="50196"/>
+            </a:srgbClr>
+          </a:solidFill>
+          <a:ln>
+            <a:noFill/>
+          </a:ln>
+        </p:spPr>
+        <p:style>
+          <a:lnRef idx="2">
+            <a:schemeClr val="accent1">
+              <a:shade val="50000"/>
+            </a:schemeClr>
+          </a:lnRef>
+          <a:fillRef idx="1">
+            <a:schemeClr val="accent1"/>
+          </a:fillRef>
+          <a:effectRef idx="0">
+            <a:schemeClr val="accent1"/>
+          </a:effectRef>
+          <a:fontRef idx="minor">
+            <a:schemeClr val="lt1"/>
+          </a:fontRef>
+        </p:style>
+        <p:txBody>
+          <a:bodyPr rtlCol="0" anchor="ctr"/>
+          <a:lstStyle/>
+          <a:p>
+            <a:pPr algn="ctr"/>
+            <a:endParaRPr lang="de-DE"/>
+          </a:p>
+        </p:txBody>
+      </p:sp>
+      <p:sp>
+        <p:nvSpPr>
+          <p:cNvPr id="7" name="Rechteck 6"/>
+          <p:cNvSpPr/>
+          <p:nvPr/>
+        </p:nvSpPr>
+        <p:spPr>
+          <a:xfrm>
+            <a:off x="730577" y="2050330"/>
+            <a:ext cx="1018095" cy="1018095"/>
+          </a:xfrm>
+          <a:prstGeom prst="rect">
+            <a:avLst/>
+          </a:prstGeom>
+          <a:solidFill>
+            <a:srgbClr val="A51E37">
+              <a:alpha val="50196"/>
+            </a:srgbClr>
+          </a:solidFill>
+          <a:ln>
+            <a:noFill/>
+          </a:ln>
+        </p:spPr>
+        <p:style>
+          <a:lnRef idx="2">
+            <a:schemeClr val="accent1">
+              <a:shade val="50000"/>
+            </a:schemeClr>
+          </a:lnRef>
+          <a:fillRef idx="1">
+            <a:schemeClr val="accent1"/>
+          </a:fillRef>
+          <a:effectRef idx="0">
+            <a:schemeClr val="accent1"/>
+          </a:effectRef>
+          <a:fontRef idx="minor">
+            <a:schemeClr val="lt1"/>
+          </a:fontRef>
+        </p:style>
+        <p:txBody>
+          <a:bodyPr rtlCol="0" anchor="ctr"/>
+          <a:lstStyle/>
+          <a:p>
+            <a:pPr algn="ctr"/>
+            <a:endParaRPr lang="de-DE"/>
+          </a:p>
+        </p:txBody>
+      </p:sp>
+      <p:cxnSp>
+        <p:nvCxnSpPr>
+          <p:cNvPr id="9" name="Gerade Verbindung mit Pfeil 8"/>
+          <p:cNvCxnSpPr/>
+          <p:nvPr/>
+        </p:nvCxnSpPr>
+        <p:spPr>
+          <a:xfrm>
+            <a:off x="1329004" y="1159496"/>
+            <a:ext cx="1262924" cy="22072"/>
+          </a:xfrm>
+          <a:prstGeom prst="straightConnector1">
+            <a:avLst/>
+          </a:prstGeom>
+          <a:ln w="127000">
+            <a:tailEnd type="triangle" w="med" len="med"/>
+          </a:ln>
+        </p:spPr>
+        <p:style>
+          <a:lnRef idx="1">
+            <a:schemeClr val="accent1"/>
+          </a:lnRef>
+          <a:fillRef idx="0">
+            <a:schemeClr val="accent1"/>
+          </a:fillRef>
+          <a:effectRef idx="0">
+            <a:schemeClr val="accent1"/>
+          </a:effectRef>
+          <a:fontRef idx="minor">
+            <a:schemeClr val="tx1"/>
+          </a:fontRef>
+        </p:style>
+      </p:cxnSp>
+      <p:sp>
+        <p:nvSpPr>
+          <p:cNvPr id="22" name="Rechteck 21"/>
+          <p:cNvSpPr/>
+          <p:nvPr/>
+        </p:nvSpPr>
+        <p:spPr>
+          <a:xfrm>
+            <a:off x="6702799" y="1780137"/>
+            <a:ext cx="1018095" cy="1018095"/>
+          </a:xfrm>
+          <a:prstGeom prst="rect">
+            <a:avLst/>
+          </a:prstGeom>
+          <a:solidFill>
+            <a:schemeClr val="tx1"/>
+          </a:solidFill>
+          <a:ln>
+            <a:noFill/>
+          </a:ln>
+          <a:effectLst/>
+          <a:scene3d>
+            <a:camera prst="isometricLeftDown"/>
+            <a:lightRig rig="threePt" dir="t"/>
+          </a:scene3d>
+        </p:spPr>
+        <p:style>
+          <a:lnRef idx="2">
+            <a:schemeClr val="accent1">
+              <a:shade val="50000"/>
+            </a:schemeClr>
+          </a:lnRef>
+          <a:fillRef idx="1">
+            <a:schemeClr val="accent1"/>
+          </a:fillRef>
+          <a:effectRef idx="0">
+            <a:schemeClr val="accent1"/>
+          </a:effectRef>
+          <a:fontRef idx="minor">
+            <a:schemeClr val="lt1"/>
+          </a:fontRef>
+        </p:style>
+        <p:txBody>
+          <a:bodyPr rtlCol="0" anchor="ctr"/>
+          <a:lstStyle/>
+          <a:p>
+            <a:pPr algn="ctr"/>
+            <a:endParaRPr lang="de-DE"/>
+          </a:p>
+        </p:txBody>
+      </p:sp>
+      <p:sp>
+        <p:nvSpPr>
+          <p:cNvPr id="23" name="Rechteck 22"/>
+          <p:cNvSpPr/>
+          <p:nvPr/>
+        </p:nvSpPr>
+        <p:spPr>
+          <a:xfrm>
+            <a:off x="5981669" y="1780137"/>
+            <a:ext cx="1018095" cy="1018095"/>
+          </a:xfrm>
+          <a:prstGeom prst="rect">
+            <a:avLst/>
+          </a:prstGeom>
+          <a:solidFill>
+            <a:schemeClr val="tx1">
+              <a:lumMod val="60000"/>
+              <a:lumOff val="40000"/>
+            </a:schemeClr>
+          </a:solidFill>
+          <a:ln>
+            <a:noFill/>
+          </a:ln>
+          <a:effectLst/>
+          <a:scene3d>
+            <a:camera prst="isometricRightUp"/>
+            <a:lightRig rig="threePt" dir="t"/>
+          </a:scene3d>
+        </p:spPr>
+        <p:style>
+          <a:lnRef idx="2">
+            <a:schemeClr val="accent1">
+              <a:shade val="50000"/>
+            </a:schemeClr>
+          </a:lnRef>
+          <a:fillRef idx="1">
+            <a:schemeClr val="accent1"/>
+          </a:fillRef>
+          <a:effectRef idx="0">
+            <a:schemeClr val="accent1"/>
+          </a:effectRef>
+          <a:fontRef idx="minor">
+            <a:schemeClr val="lt1"/>
+          </a:fontRef>
+        </p:style>
+        <p:txBody>
+          <a:bodyPr rtlCol="0" anchor="ctr"/>
+          <a:lstStyle/>
+          <a:p>
+            <a:pPr algn="ctr"/>
+            <a:endParaRPr lang="de-DE"/>
+          </a:p>
+        </p:txBody>
+      </p:sp>
+      <p:sp>
+        <p:nvSpPr>
+          <p:cNvPr id="26" name="Freihandform 25"/>
+          <p:cNvSpPr/>
+          <p:nvPr/>
+        </p:nvSpPr>
+        <p:spPr>
+          <a:xfrm>
+            <a:off x="1329004" y="2285102"/>
+            <a:ext cx="1242495" cy="551756"/>
+          </a:xfrm>
+          <a:custGeom>
+            <a:avLst/>
+            <a:gdLst>
+              <a:gd name="connsiteX0" fmla="*/ 0 w 1817441"/>
+              <a:gd name="connsiteY0" fmla="*/ 45360 h 596821"/>
+              <a:gd name="connsiteX1" fmla="*/ 749694 w 1817441"/>
+              <a:gd name="connsiteY1" fmla="*/ 45360 h 596821"/>
+              <a:gd name="connsiteX2" fmla="*/ 1147259 w 1817441"/>
+              <a:gd name="connsiteY2" fmla="*/ 516759 h 596821"/>
+              <a:gd name="connsiteX3" fmla="*/ 1817441 w 1817441"/>
+              <a:gd name="connsiteY3" fmla="*/ 596272 h 596821"/>
+              <a:gd name="connsiteX4" fmla="*/ 1817441 w 1817441"/>
+              <a:gd name="connsiteY4" fmla="*/ 596272 h 596821"/>
+              <a:gd name="connsiteX0" fmla="*/ 0 w 1817441"/>
+              <a:gd name="connsiteY0" fmla="*/ 17452 h 568364"/>
+              <a:gd name="connsiteX1" fmla="*/ 749694 w 1817441"/>
+              <a:gd name="connsiteY1" fmla="*/ 85606 h 568364"/>
+              <a:gd name="connsiteX2" fmla="*/ 1147259 w 1817441"/>
+              <a:gd name="connsiteY2" fmla="*/ 488851 h 568364"/>
+              <a:gd name="connsiteX3" fmla="*/ 1817441 w 1817441"/>
+              <a:gd name="connsiteY3" fmla="*/ 568364 h 568364"/>
+              <a:gd name="connsiteX4" fmla="*/ 1817441 w 1817441"/>
+              <a:gd name="connsiteY4" fmla="*/ 568364 h 568364"/>
+              <a:gd name="connsiteX0" fmla="*/ 0 w 1817441"/>
+              <a:gd name="connsiteY0" fmla="*/ 15245 h 566157"/>
+              <a:gd name="connsiteX1" fmla="*/ 647463 w 1817441"/>
+              <a:gd name="connsiteY1" fmla="*/ 94758 h 566157"/>
+              <a:gd name="connsiteX2" fmla="*/ 1147259 w 1817441"/>
+              <a:gd name="connsiteY2" fmla="*/ 486644 h 566157"/>
+              <a:gd name="connsiteX3" fmla="*/ 1817441 w 1817441"/>
+              <a:gd name="connsiteY3" fmla="*/ 566157 h 566157"/>
+              <a:gd name="connsiteX4" fmla="*/ 1817441 w 1817441"/>
+              <a:gd name="connsiteY4" fmla="*/ 566157 h 566157"/>
+              <a:gd name="connsiteX0" fmla="*/ 0 w 1817441"/>
+              <a:gd name="connsiteY0" fmla="*/ 15245 h 566157"/>
+              <a:gd name="connsiteX1" fmla="*/ 647463 w 1817441"/>
+              <a:gd name="connsiteY1" fmla="*/ 94758 h 566157"/>
+              <a:gd name="connsiteX2" fmla="*/ 1096144 w 1817441"/>
+              <a:gd name="connsiteY2" fmla="*/ 486644 h 566157"/>
+              <a:gd name="connsiteX3" fmla="*/ 1817441 w 1817441"/>
+              <a:gd name="connsiteY3" fmla="*/ 566157 h 566157"/>
+              <a:gd name="connsiteX4" fmla="*/ 1817441 w 1817441"/>
+              <a:gd name="connsiteY4" fmla="*/ 566157 h 566157"/>
+              <a:gd name="connsiteX0" fmla="*/ 0 w 1817441"/>
+              <a:gd name="connsiteY0" fmla="*/ 21826 h 572738"/>
+              <a:gd name="connsiteX1" fmla="*/ 636104 w 1817441"/>
+              <a:gd name="connsiteY1" fmla="*/ 72941 h 572738"/>
+              <a:gd name="connsiteX2" fmla="*/ 1096144 w 1817441"/>
+              <a:gd name="connsiteY2" fmla="*/ 493225 h 572738"/>
+              <a:gd name="connsiteX3" fmla="*/ 1817441 w 1817441"/>
+              <a:gd name="connsiteY3" fmla="*/ 572738 h 572738"/>
+              <a:gd name="connsiteX4" fmla="*/ 1817441 w 1817441"/>
+              <a:gd name="connsiteY4" fmla="*/ 572738 h 572738"/>
+              <a:gd name="connsiteX0" fmla="*/ 0 w 1817441"/>
+              <a:gd name="connsiteY0" fmla="*/ 13469 h 564381"/>
+              <a:gd name="connsiteX1" fmla="*/ 636104 w 1817441"/>
+              <a:gd name="connsiteY1" fmla="*/ 104340 h 564381"/>
+              <a:gd name="connsiteX2" fmla="*/ 1096144 w 1817441"/>
+              <a:gd name="connsiteY2" fmla="*/ 484868 h 564381"/>
+              <a:gd name="connsiteX3" fmla="*/ 1817441 w 1817441"/>
+              <a:gd name="connsiteY3" fmla="*/ 564381 h 564381"/>
+              <a:gd name="connsiteX4" fmla="*/ 1817441 w 1817441"/>
+              <a:gd name="connsiteY4" fmla="*/ 564381 h 564381"/>
+              <a:gd name="connsiteX0" fmla="*/ 0 w 1817441"/>
+              <a:gd name="connsiteY0" fmla="*/ 0 h 550912"/>
+              <a:gd name="connsiteX1" fmla="*/ 636104 w 1817441"/>
+              <a:gd name="connsiteY1" fmla="*/ 90871 h 550912"/>
+              <a:gd name="connsiteX2" fmla="*/ 1096144 w 1817441"/>
+              <a:gd name="connsiteY2" fmla="*/ 471399 h 550912"/>
+              <a:gd name="connsiteX3" fmla="*/ 1817441 w 1817441"/>
+              <a:gd name="connsiteY3" fmla="*/ 550912 h 550912"/>
+              <a:gd name="connsiteX4" fmla="*/ 1817441 w 1817441"/>
+              <a:gd name="connsiteY4" fmla="*/ 550912 h 550912"/>
+              <a:gd name="connsiteX0" fmla="*/ 0 w 1817441"/>
+              <a:gd name="connsiteY0" fmla="*/ 844 h 551756"/>
+              <a:gd name="connsiteX1" fmla="*/ 636104 w 1817441"/>
+              <a:gd name="connsiteY1" fmla="*/ 91715 h 551756"/>
+              <a:gd name="connsiteX2" fmla="*/ 1096144 w 1817441"/>
+              <a:gd name="connsiteY2" fmla="*/ 472243 h 551756"/>
+              <a:gd name="connsiteX3" fmla="*/ 1817441 w 1817441"/>
+              <a:gd name="connsiteY3" fmla="*/ 551756 h 551756"/>
+              <a:gd name="connsiteX4" fmla="*/ 1817441 w 1817441"/>
+              <a:gd name="connsiteY4" fmla="*/ 551756 h 551756"/>
+              <a:gd name="connsiteX0" fmla="*/ 0 w 1817441"/>
+              <a:gd name="connsiteY0" fmla="*/ 844 h 551756"/>
+              <a:gd name="connsiteX1" fmla="*/ 636104 w 1817441"/>
+              <a:gd name="connsiteY1" fmla="*/ 91715 h 551756"/>
+              <a:gd name="connsiteX2" fmla="*/ 1175657 w 1817441"/>
+              <a:gd name="connsiteY2" fmla="*/ 472243 h 551756"/>
+              <a:gd name="connsiteX3" fmla="*/ 1817441 w 1817441"/>
+              <a:gd name="connsiteY3" fmla="*/ 551756 h 551756"/>
+              <a:gd name="connsiteX4" fmla="*/ 1817441 w 1817441"/>
+              <a:gd name="connsiteY4" fmla="*/ 551756 h 551756"/>
+              <a:gd name="connsiteX0" fmla="*/ 0 w 1817441"/>
+              <a:gd name="connsiteY0" fmla="*/ 844 h 551756"/>
+              <a:gd name="connsiteX1" fmla="*/ 636104 w 1817441"/>
+              <a:gd name="connsiteY1" fmla="*/ 91715 h 551756"/>
+              <a:gd name="connsiteX2" fmla="*/ 1175657 w 1817441"/>
+              <a:gd name="connsiteY2" fmla="*/ 472243 h 551756"/>
+              <a:gd name="connsiteX3" fmla="*/ 1817441 w 1817441"/>
+              <a:gd name="connsiteY3" fmla="*/ 551756 h 551756"/>
+              <a:gd name="connsiteX4" fmla="*/ 1817441 w 1817441"/>
+              <a:gd name="connsiteY4" fmla="*/ 551756 h 551756"/>
+            </a:gdLst>
+            <a:ahLst/>
+            <a:cxnLst>
+              <a:cxn ang="0">
+                <a:pos x="connsiteX0" y="connsiteY0"/>
+              </a:cxn>
+              <a:cxn ang="0">
+                <a:pos x="connsiteX1" y="connsiteY1"/>
+              </a:cxn>
+              <a:cxn ang="0">
+                <a:pos x="connsiteX2" y="connsiteY2"/>
+              </a:cxn>
+              <a:cxn ang="0">
+                <a:pos x="connsiteX3" y="connsiteY3"/>
+              </a:cxn>
+              <a:cxn ang="0">
+                <a:pos x="connsiteX4" y="connsiteY4"/>
+              </a:cxn>
+            </a:cxnLst>
+            <a:rect l="l" t="t" r="r" b="b"/>
+            <a:pathLst>
+              <a:path w="1817441" h="551756">
+                <a:moveTo>
+                  <a:pt x="0" y="844"/>
+                </a:moveTo>
+                <a:cubicBezTo>
+                  <a:pt x="370114" y="-4362"/>
+                  <a:pt x="440161" y="13149"/>
+                  <a:pt x="636104" y="91715"/>
+                </a:cubicBezTo>
+                <a:cubicBezTo>
+                  <a:pt x="832047" y="170282"/>
+                  <a:pt x="978768" y="395570"/>
+                  <a:pt x="1175657" y="472243"/>
+                </a:cubicBezTo>
+                <a:cubicBezTo>
+                  <a:pt x="1372546" y="548916"/>
+                  <a:pt x="1562810" y="538504"/>
+                  <a:pt x="1817441" y="551756"/>
+                </a:cubicBezTo>
+                <a:lnTo>
+                  <a:pt x="1817441" y="551756"/>
+                </a:lnTo>
+              </a:path>
+            </a:pathLst>
+          </a:custGeom>
+          <a:noFill/>
+          <a:ln w="127000">
+            <a:gradFill flip="none" rotWithShape="1">
+              <a:gsLst>
+                <a:gs pos="0">
+                  <a:schemeClr val="accent1"/>
+                </a:gs>
+                <a:gs pos="89000">
+                  <a:schemeClr val="accent4"/>
+                </a:gs>
+              </a:gsLst>
+              <a:lin ang="0" scaled="1"/>
+              <a:tileRect/>
+            </a:gradFill>
+            <a:tailEnd type="triangle"/>
+          </a:ln>
+        </p:spPr>
+        <p:style>
+          <a:lnRef idx="2">
+            <a:schemeClr val="accent1">
+              <a:shade val="50000"/>
+            </a:schemeClr>
+          </a:lnRef>
+          <a:fillRef idx="1">
+            <a:schemeClr val="accent1"/>
+          </a:fillRef>
+          <a:effectRef idx="0">
+            <a:schemeClr val="accent1"/>
+          </a:effectRef>
+          <a:fontRef idx="minor">
+            <a:schemeClr val="lt1"/>
+          </a:fontRef>
+        </p:style>
+        <p:txBody>
+          <a:bodyPr rtlCol="0" anchor="ctr"/>
+          <a:lstStyle/>
+          <a:p>
+            <a:pPr algn="ctr"/>
+            <a:endParaRPr lang="de-DE"/>
+          </a:p>
+        </p:txBody>
+      </p:sp>
+      <p:sp>
+        <p:nvSpPr>
+          <p:cNvPr id="27" name="Freihandform 26"/>
+          <p:cNvSpPr/>
+          <p:nvPr/>
+        </p:nvSpPr>
+        <p:spPr>
+          <a:xfrm flipV="1">
+            <a:off x="1329004" y="2285102"/>
+            <a:ext cx="1242495" cy="551756"/>
+          </a:xfrm>
+          <a:custGeom>
+            <a:avLst/>
+            <a:gdLst>
+              <a:gd name="connsiteX0" fmla="*/ 0 w 1817441"/>
+              <a:gd name="connsiteY0" fmla="*/ 45360 h 596821"/>
+              <a:gd name="connsiteX1" fmla="*/ 749694 w 1817441"/>
+              <a:gd name="connsiteY1" fmla="*/ 45360 h 596821"/>
+              <a:gd name="connsiteX2" fmla="*/ 1147259 w 1817441"/>
+              <a:gd name="connsiteY2" fmla="*/ 516759 h 596821"/>
+              <a:gd name="connsiteX3" fmla="*/ 1817441 w 1817441"/>
+              <a:gd name="connsiteY3" fmla="*/ 596272 h 596821"/>
+              <a:gd name="connsiteX4" fmla="*/ 1817441 w 1817441"/>
+              <a:gd name="connsiteY4" fmla="*/ 596272 h 596821"/>
+              <a:gd name="connsiteX0" fmla="*/ 0 w 1817441"/>
+              <a:gd name="connsiteY0" fmla="*/ 17452 h 568364"/>
+              <a:gd name="connsiteX1" fmla="*/ 749694 w 1817441"/>
+              <a:gd name="connsiteY1" fmla="*/ 85606 h 568364"/>
+              <a:gd name="connsiteX2" fmla="*/ 1147259 w 1817441"/>
+              <a:gd name="connsiteY2" fmla="*/ 488851 h 568364"/>
+              <a:gd name="connsiteX3" fmla="*/ 1817441 w 1817441"/>
+              <a:gd name="connsiteY3" fmla="*/ 568364 h 568364"/>
+              <a:gd name="connsiteX4" fmla="*/ 1817441 w 1817441"/>
+              <a:gd name="connsiteY4" fmla="*/ 568364 h 568364"/>
+              <a:gd name="connsiteX0" fmla="*/ 0 w 1817441"/>
+              <a:gd name="connsiteY0" fmla="*/ 15245 h 566157"/>
+              <a:gd name="connsiteX1" fmla="*/ 647463 w 1817441"/>
+              <a:gd name="connsiteY1" fmla="*/ 94758 h 566157"/>
+              <a:gd name="connsiteX2" fmla="*/ 1147259 w 1817441"/>
+              <a:gd name="connsiteY2" fmla="*/ 486644 h 566157"/>
+              <a:gd name="connsiteX3" fmla="*/ 1817441 w 1817441"/>
+              <a:gd name="connsiteY3" fmla="*/ 566157 h 566157"/>
+              <a:gd name="connsiteX4" fmla="*/ 1817441 w 1817441"/>
+              <a:gd name="connsiteY4" fmla="*/ 566157 h 566157"/>
+              <a:gd name="connsiteX0" fmla="*/ 0 w 1817441"/>
+              <a:gd name="connsiteY0" fmla="*/ 15245 h 566157"/>
+              <a:gd name="connsiteX1" fmla="*/ 647463 w 1817441"/>
+              <a:gd name="connsiteY1" fmla="*/ 94758 h 566157"/>
+              <a:gd name="connsiteX2" fmla="*/ 1096144 w 1817441"/>
+              <a:gd name="connsiteY2" fmla="*/ 486644 h 566157"/>
+              <a:gd name="connsiteX3" fmla="*/ 1817441 w 1817441"/>
+              <a:gd name="connsiteY3" fmla="*/ 566157 h 566157"/>
+              <a:gd name="connsiteX4" fmla="*/ 1817441 w 1817441"/>
+              <a:gd name="connsiteY4" fmla="*/ 566157 h 566157"/>
+              <a:gd name="connsiteX0" fmla="*/ 0 w 1817441"/>
+              <a:gd name="connsiteY0" fmla="*/ 21826 h 572738"/>
+              <a:gd name="connsiteX1" fmla="*/ 636104 w 1817441"/>
+              <a:gd name="connsiteY1" fmla="*/ 72941 h 572738"/>
+              <a:gd name="connsiteX2" fmla="*/ 1096144 w 1817441"/>
+              <a:gd name="connsiteY2" fmla="*/ 493225 h 572738"/>
+              <a:gd name="connsiteX3" fmla="*/ 1817441 w 1817441"/>
+              <a:gd name="connsiteY3" fmla="*/ 572738 h 572738"/>
+              <a:gd name="connsiteX4" fmla="*/ 1817441 w 1817441"/>
+              <a:gd name="connsiteY4" fmla="*/ 572738 h 572738"/>
+              <a:gd name="connsiteX0" fmla="*/ 0 w 1817441"/>
+              <a:gd name="connsiteY0" fmla="*/ 13469 h 564381"/>
+              <a:gd name="connsiteX1" fmla="*/ 636104 w 1817441"/>
+              <a:gd name="connsiteY1" fmla="*/ 104340 h 564381"/>
+              <a:gd name="connsiteX2" fmla="*/ 1096144 w 1817441"/>
+              <a:gd name="connsiteY2" fmla="*/ 484868 h 564381"/>
+              <a:gd name="connsiteX3" fmla="*/ 1817441 w 1817441"/>
+              <a:gd name="connsiteY3" fmla="*/ 564381 h 564381"/>
+              <a:gd name="connsiteX4" fmla="*/ 1817441 w 1817441"/>
+              <a:gd name="connsiteY4" fmla="*/ 564381 h 564381"/>
+              <a:gd name="connsiteX0" fmla="*/ 0 w 1817441"/>
+              <a:gd name="connsiteY0" fmla="*/ 0 h 550912"/>
+              <a:gd name="connsiteX1" fmla="*/ 636104 w 1817441"/>
+              <a:gd name="connsiteY1" fmla="*/ 90871 h 550912"/>
+              <a:gd name="connsiteX2" fmla="*/ 1096144 w 1817441"/>
+              <a:gd name="connsiteY2" fmla="*/ 471399 h 550912"/>
+              <a:gd name="connsiteX3" fmla="*/ 1817441 w 1817441"/>
+              <a:gd name="connsiteY3" fmla="*/ 550912 h 550912"/>
+              <a:gd name="connsiteX4" fmla="*/ 1817441 w 1817441"/>
+              <a:gd name="connsiteY4" fmla="*/ 550912 h 550912"/>
+              <a:gd name="connsiteX0" fmla="*/ 0 w 1817441"/>
+              <a:gd name="connsiteY0" fmla="*/ 844 h 551756"/>
+              <a:gd name="connsiteX1" fmla="*/ 636104 w 1817441"/>
+              <a:gd name="connsiteY1" fmla="*/ 91715 h 551756"/>
+              <a:gd name="connsiteX2" fmla="*/ 1096144 w 1817441"/>
+              <a:gd name="connsiteY2" fmla="*/ 472243 h 551756"/>
+              <a:gd name="connsiteX3" fmla="*/ 1817441 w 1817441"/>
+              <a:gd name="connsiteY3" fmla="*/ 551756 h 551756"/>
+              <a:gd name="connsiteX4" fmla="*/ 1817441 w 1817441"/>
+              <a:gd name="connsiteY4" fmla="*/ 551756 h 551756"/>
+              <a:gd name="connsiteX0" fmla="*/ 0 w 1817441"/>
+              <a:gd name="connsiteY0" fmla="*/ 844 h 551756"/>
+              <a:gd name="connsiteX1" fmla="*/ 636104 w 1817441"/>
+              <a:gd name="connsiteY1" fmla="*/ 91715 h 551756"/>
+              <a:gd name="connsiteX2" fmla="*/ 1175657 w 1817441"/>
+              <a:gd name="connsiteY2" fmla="*/ 472243 h 551756"/>
+              <a:gd name="connsiteX3" fmla="*/ 1817441 w 1817441"/>
+              <a:gd name="connsiteY3" fmla="*/ 551756 h 551756"/>
+              <a:gd name="connsiteX4" fmla="*/ 1817441 w 1817441"/>
+              <a:gd name="connsiteY4" fmla="*/ 551756 h 551756"/>
+              <a:gd name="connsiteX0" fmla="*/ 0 w 1817441"/>
+              <a:gd name="connsiteY0" fmla="*/ 844 h 551756"/>
+              <a:gd name="connsiteX1" fmla="*/ 636104 w 1817441"/>
+              <a:gd name="connsiteY1" fmla="*/ 91715 h 551756"/>
+              <a:gd name="connsiteX2" fmla="*/ 1175657 w 1817441"/>
+              <a:gd name="connsiteY2" fmla="*/ 472243 h 551756"/>
+              <a:gd name="connsiteX3" fmla="*/ 1817441 w 1817441"/>
+              <a:gd name="connsiteY3" fmla="*/ 551756 h 551756"/>
+              <a:gd name="connsiteX4" fmla="*/ 1817441 w 1817441"/>
+              <a:gd name="connsiteY4" fmla="*/ 551756 h 551756"/>
+            </a:gdLst>
+            <a:ahLst/>
+            <a:cxnLst>
+              <a:cxn ang="0">
+                <a:pos x="connsiteX0" y="connsiteY0"/>
+              </a:cxn>
+              <a:cxn ang="0">
+                <a:pos x="connsiteX1" y="connsiteY1"/>
+              </a:cxn>
+              <a:cxn ang="0">
+                <a:pos x="connsiteX2" y="connsiteY2"/>
+              </a:cxn>
+              <a:cxn ang="0">
+                <a:pos x="connsiteX3" y="connsiteY3"/>
+              </a:cxn>
+              <a:cxn ang="0">
+                <a:pos x="connsiteX4" y="connsiteY4"/>
+              </a:cxn>
+            </a:cxnLst>
+            <a:rect l="l" t="t" r="r" b="b"/>
+            <a:pathLst>
+              <a:path w="1817441" h="551756">
+                <a:moveTo>
+                  <a:pt x="0" y="844"/>
+                </a:moveTo>
+                <a:cubicBezTo>
+                  <a:pt x="370114" y="-4362"/>
+                  <a:pt x="440161" y="13149"/>
+                  <a:pt x="636104" y="91715"/>
+                </a:cubicBezTo>
+                <a:cubicBezTo>
+                  <a:pt x="832047" y="170282"/>
+                  <a:pt x="978768" y="395570"/>
+                  <a:pt x="1175657" y="472243"/>
+                </a:cubicBezTo>
+                <a:cubicBezTo>
+                  <a:pt x="1372546" y="548916"/>
+                  <a:pt x="1562810" y="538504"/>
+                  <a:pt x="1817441" y="551756"/>
+                </a:cubicBezTo>
+                <a:lnTo>
+                  <a:pt x="1817441" y="551756"/>
+                </a:lnTo>
+              </a:path>
+            </a:pathLst>
+          </a:custGeom>
+          <a:noFill/>
+          <a:ln w="127000">
+            <a:gradFill flip="none" rotWithShape="1">
+              <a:gsLst>
+                <a:gs pos="0">
+                  <a:schemeClr val="accent1"/>
+                </a:gs>
+                <a:gs pos="89000">
+                  <a:schemeClr val="accent4"/>
+                </a:gs>
+              </a:gsLst>
+              <a:lin ang="0" scaled="1"/>
+              <a:tileRect/>
+            </a:gradFill>
+            <a:tailEnd type="triangle"/>
+          </a:ln>
+        </p:spPr>
+        <p:style>
+          <a:lnRef idx="2">
+            <a:schemeClr val="accent1">
+              <a:shade val="50000"/>
+            </a:schemeClr>
+          </a:lnRef>
+          <a:fillRef idx="1">
+            <a:schemeClr val="accent1"/>
+          </a:fillRef>
+          <a:effectRef idx="0">
+            <a:schemeClr val="accent1"/>
+          </a:effectRef>
+          <a:fontRef idx="minor">
+            <a:schemeClr val="lt1"/>
+          </a:fontRef>
+        </p:style>
+        <p:txBody>
+          <a:bodyPr rtlCol="0" anchor="ctr"/>
+          <a:lstStyle/>
+          <a:p>
+            <a:pPr algn="ctr"/>
+            <a:endParaRPr lang="de-DE"/>
+          </a:p>
+        </p:txBody>
+      </p:sp>
+      <p:sp>
+        <p:nvSpPr>
+          <p:cNvPr id="28" name="Raute 27"/>
+          <p:cNvSpPr/>
+          <p:nvPr/>
+        </p:nvSpPr>
+        <p:spPr>
+          <a:xfrm>
+            <a:off x="9966932" y="2836858"/>
+            <a:ext cx="1221093" cy="817849"/>
+          </a:xfrm>
+          <a:prstGeom prst="diamond">
+            <a:avLst/>
+          </a:prstGeom>
+          <a:solidFill>
+            <a:srgbClr val="A51E37">
+              <a:alpha val="50196"/>
+            </a:srgbClr>
+          </a:solidFill>
+          <a:ln>
+            <a:noFill/>
+          </a:ln>
+          <a:effectLst>
+            <a:outerShdw blurRad="152400" dist="25400" dir="5400000" sx="90000" sy="-19000" rotWithShape="0">
+              <a:prstClr val="black">
+                <a:alpha val="40000"/>
+              </a:prstClr>
+            </a:outerShdw>
+          </a:effectLst>
+        </p:spPr>
+        <p:style>
+          <a:lnRef idx="2">
+            <a:schemeClr val="accent1">
+              <a:shade val="50000"/>
+            </a:schemeClr>
+          </a:lnRef>
+          <a:fillRef idx="1">
+            <a:schemeClr val="accent1"/>
+          </a:fillRef>
+          <a:effectRef idx="0">
+            <a:schemeClr val="accent1"/>
+          </a:effectRef>
+          <a:fontRef idx="minor">
+            <a:schemeClr val="lt1"/>
+          </a:fontRef>
+        </p:style>
+        <p:txBody>
+          <a:bodyPr rtlCol="0" anchor="ctr"/>
+          <a:lstStyle/>
+          <a:p>
+            <a:pPr algn="ctr"/>
+            <a:endParaRPr lang="de-DE"/>
+          </a:p>
+        </p:txBody>
+      </p:sp>
+      <p:sp>
+        <p:nvSpPr>
+          <p:cNvPr id="29" name="Raute 27"/>
+          <p:cNvSpPr/>
+          <p:nvPr/>
+        </p:nvSpPr>
+        <p:spPr>
+          <a:xfrm>
+            <a:off x="10431705" y="2965993"/>
+            <a:ext cx="1221093" cy="817849"/>
+          </a:xfrm>
+          <a:prstGeom prst="diamond">
+            <a:avLst/>
+          </a:prstGeom>
+          <a:solidFill>
+            <a:schemeClr val="accent4">
+              <a:alpha val="50196"/>
+            </a:schemeClr>
+          </a:solidFill>
+          <a:ln>
+            <a:noFill/>
+          </a:ln>
+          <a:effectLst>
+            <a:outerShdw blurRad="152400" dist="25400" dir="5400000" sx="90000" sy="-19000" rotWithShape="0">
+              <a:prstClr val="black">
+                <a:alpha val="40000"/>
+              </a:prstClr>
+            </a:outerShdw>
+          </a:effectLst>
+        </p:spPr>
+        <p:style>
+          <a:lnRef idx="2">
+            <a:schemeClr val="accent1">
+              <a:shade val="50000"/>
+            </a:schemeClr>
+          </a:lnRef>
+          <a:fillRef idx="1">
+            <a:schemeClr val="accent1"/>
+          </a:fillRef>
+          <a:effectRef idx="0">
+            <a:schemeClr val="accent1"/>
+          </a:effectRef>
+          <a:fontRef idx="minor">
+            <a:schemeClr val="lt1"/>
+          </a:fontRef>
+        </p:style>
+        <p:txBody>
+          <a:bodyPr rtlCol="0" anchor="ctr"/>
+          <a:lstStyle/>
+          <a:p>
+            <a:pPr algn="ctr"/>
+            <a:endParaRPr lang="de-DE"/>
+          </a:p>
+        </p:txBody>
+      </p:sp>
+      <p:sp>
+        <p:nvSpPr>
+          <p:cNvPr id="30" name="Rechteck 29"/>
+          <p:cNvSpPr/>
+          <p:nvPr/>
+        </p:nvSpPr>
+        <p:spPr>
+          <a:xfrm>
+            <a:off x="1329004" y="3266803"/>
+            <a:ext cx="1018095" cy="1018095"/>
+          </a:xfrm>
+          <a:prstGeom prst="rect">
+            <a:avLst/>
+          </a:prstGeom>
+          <a:solidFill>
+            <a:schemeClr val="accent4">
+              <a:alpha val="50196"/>
+            </a:schemeClr>
+          </a:solidFill>
+          <a:ln>
+            <a:noFill/>
+          </a:ln>
+          <a:effectLst>
+            <a:outerShdw blurRad="50800" sy="23000" kx="-1200000" algn="bl" rotWithShape="0">
+              <a:prstClr val="black">
+                <a:alpha val="40000"/>
+              </a:prstClr>
+            </a:outerShdw>
+          </a:effectLst>
+          <a:scene3d>
+            <a:camera prst="isometricOffAxis1Left"/>
+            <a:lightRig rig="threePt" dir="t"/>
+          </a:scene3d>
+        </p:spPr>
+        <p:style>
+          <a:lnRef idx="2">
+            <a:schemeClr val="accent1">
+              <a:shade val="50000"/>
+            </a:schemeClr>
+          </a:lnRef>
+          <a:fillRef idx="1">
+            <a:schemeClr val="accent1"/>
+          </a:fillRef>
+          <a:effectRef idx="0">
+            <a:schemeClr val="accent1"/>
+          </a:effectRef>
+          <a:fontRef idx="minor">
+            <a:schemeClr val="lt1"/>
+          </a:fontRef>
+        </p:style>
+        <p:txBody>
+          <a:bodyPr rtlCol="0" anchor="ctr"/>
+          <a:lstStyle/>
+          <a:p>
+            <a:pPr algn="ctr"/>
+            <a:endParaRPr lang="de-DE"/>
+          </a:p>
+        </p:txBody>
+      </p:sp>
+      <p:sp>
+        <p:nvSpPr>
+          <p:cNvPr id="31" name="Rechteck 30"/>
+          <p:cNvSpPr/>
+          <p:nvPr/>
+        </p:nvSpPr>
+        <p:spPr>
+          <a:xfrm>
+            <a:off x="1030644" y="3480614"/>
+            <a:ext cx="1018095" cy="1018095"/>
+          </a:xfrm>
+          <a:prstGeom prst="rect">
+            <a:avLst/>
+          </a:prstGeom>
+          <a:solidFill>
+            <a:srgbClr val="A51E37">
+              <a:alpha val="50196"/>
+            </a:srgbClr>
+          </a:solidFill>
+          <a:ln>
+            <a:noFill/>
+          </a:ln>
+          <a:effectLst>
+            <a:outerShdw blurRad="50800" sy="23000" kx="-1200000" algn="bl" rotWithShape="0">
+              <a:prstClr val="black">
+                <a:alpha val="40000"/>
+              </a:prstClr>
+            </a:outerShdw>
+          </a:effectLst>
+          <a:scene3d>
+            <a:camera prst="isometricOffAxis1Left"/>
+            <a:lightRig rig="threePt" dir="t"/>
+          </a:scene3d>
+        </p:spPr>
+        <p:style>
+          <a:lnRef idx="2">
+            <a:schemeClr val="accent1">
+              <a:shade val="50000"/>
+            </a:schemeClr>
+          </a:lnRef>
+          <a:fillRef idx="1">
+            <a:schemeClr val="accent1"/>
+          </a:fillRef>
+          <a:effectRef idx="0">
+            <a:schemeClr val="accent1"/>
+          </a:effectRef>
+          <a:fontRef idx="minor">
+            <a:schemeClr val="lt1"/>
+          </a:fontRef>
+        </p:style>
+        <p:txBody>
+          <a:bodyPr rtlCol="0" anchor="ctr"/>
+          <a:lstStyle/>
+          <a:p>
+            <a:pPr algn="ctr"/>
+            <a:endParaRPr lang="de-DE"/>
+          </a:p>
+        </p:txBody>
+      </p:sp>
+      <p:sp>
+        <p:nvSpPr>
+          <p:cNvPr id="2" name="Zylinder 1"/>
+          <p:cNvSpPr/>
+          <p:nvPr/>
+        </p:nvSpPr>
+        <p:spPr>
+          <a:xfrm rot="14398270" flipH="1">
+            <a:off x="6689610" y="2348401"/>
+            <a:ext cx="277585" cy="453943"/>
+          </a:xfrm>
+          <a:prstGeom prst="can">
+            <a:avLst>
+              <a:gd name="adj" fmla="val 57944"/>
+            </a:avLst>
+          </a:prstGeom>
+          <a:gradFill flip="none" rotWithShape="1">
+            <a:gsLst>
+              <a:gs pos="0">
+                <a:schemeClr val="tx2">
+                  <a:lumMod val="20000"/>
+                  <a:lumOff val="80000"/>
+                </a:schemeClr>
+              </a:gs>
+              <a:gs pos="94000">
+                <a:schemeClr val="accent1">
+                  <a:lumMod val="100000"/>
+                </a:schemeClr>
+              </a:gs>
+            </a:gsLst>
+            <a:lin ang="600000" scaled="0"/>
+            <a:tileRect/>
+          </a:gradFill>
+          <a:ln>
+            <a:noFill/>
+          </a:ln>
+        </p:spPr>
+        <p:style>
+          <a:lnRef idx="2">
+            <a:schemeClr val="accent1">
+              <a:shade val="50000"/>
+            </a:schemeClr>
+          </a:lnRef>
+          <a:fillRef idx="1">
+            <a:schemeClr val="accent1"/>
+          </a:fillRef>
+          <a:effectRef idx="0">
+            <a:schemeClr val="accent1"/>
+          </a:effectRef>
+          <a:fontRef idx="minor">
+            <a:schemeClr val="lt1"/>
+          </a:fontRef>
+        </p:style>
+        <p:txBody>
+          <a:bodyPr rtlCol="0" anchor="ctr"/>
+          <a:lstStyle/>
+          <a:p>
+            <a:pPr algn="ctr"/>
+            <a:endParaRPr lang="de-DE"/>
+          </a:p>
+        </p:txBody>
+      </p:sp>
+      <p:sp>
+        <p:nvSpPr>
+          <p:cNvPr id="8" name="Ellipse 7"/>
+          <p:cNvSpPr/>
+          <p:nvPr/>
+        </p:nvSpPr>
+        <p:spPr>
+          <a:xfrm>
+            <a:off x="6132494" y="1919166"/>
+            <a:ext cx="761316" cy="761316"/>
+          </a:xfrm>
+          <a:prstGeom prst="ellipse">
+            <a:avLst/>
+          </a:prstGeom>
+          <a:gradFill flip="none" rotWithShape="1">
+            <a:gsLst>
+              <a:gs pos="52000">
+                <a:schemeClr val="tx2">
+                  <a:lumMod val="60000"/>
+                  <a:lumOff val="40000"/>
+                </a:schemeClr>
+              </a:gs>
+              <a:gs pos="100000">
+                <a:schemeClr val="bg1">
+                  <a:alpha val="0"/>
+                </a:schemeClr>
+              </a:gs>
+            </a:gsLst>
+            <a:path path="circle">
+              <a:fillToRect l="50000" t="50000" r="50000" b="50000"/>
+            </a:path>
+            <a:tileRect/>
+          </a:gradFill>
+          <a:ln>
+            <a:noFill/>
+          </a:ln>
+          <a:scene3d>
+            <a:camera prst="isometricRightUp"/>
+            <a:lightRig rig="threePt" dir="t"/>
+          </a:scene3d>
+        </p:spPr>
+        <p:style>
+          <a:lnRef idx="2">
+            <a:schemeClr val="accent1">
+              <a:shade val="50000"/>
+            </a:schemeClr>
+          </a:lnRef>
+          <a:fillRef idx="1">
+            <a:schemeClr val="accent1"/>
+          </a:fillRef>
+          <a:effectRef idx="0">
+            <a:schemeClr val="accent1"/>
+          </a:effectRef>
+          <a:fontRef idx="minor">
+            <a:schemeClr val="lt1"/>
+          </a:fontRef>
+        </p:style>
+        <p:txBody>
+          <a:bodyPr rtlCol="0" anchor="ctr"/>
+          <a:lstStyle/>
+          <a:p>
+            <a:pPr algn="ctr"/>
+            <a:endParaRPr lang="de-DE"/>
+          </a:p>
+        </p:txBody>
+      </p:sp>
+      <p:sp>
+        <p:nvSpPr>
+          <p:cNvPr id="20" name="Ellipse 19"/>
+          <p:cNvSpPr/>
+          <p:nvPr/>
+        </p:nvSpPr>
+        <p:spPr>
+          <a:xfrm>
+            <a:off x="6828402" y="1919166"/>
+            <a:ext cx="761316" cy="761316"/>
+          </a:xfrm>
+          <a:prstGeom prst="ellipse">
+            <a:avLst/>
+          </a:prstGeom>
+          <a:gradFill flip="none" rotWithShape="1">
+            <a:gsLst>
+              <a:gs pos="52000">
+                <a:schemeClr val="accent4"/>
+              </a:gs>
+              <a:gs pos="100000">
+                <a:schemeClr val="bg1">
+                  <a:alpha val="0"/>
+                </a:schemeClr>
+              </a:gs>
+            </a:gsLst>
+            <a:path path="circle">
+              <a:fillToRect l="50000" t="50000" r="50000" b="50000"/>
+            </a:path>
+            <a:tileRect/>
+          </a:gradFill>
+          <a:ln>
+            <a:noFill/>
+          </a:ln>
+          <a:scene3d>
+            <a:camera prst="isometricLeftDown"/>
+            <a:lightRig rig="threePt" dir="t"/>
+          </a:scene3d>
+        </p:spPr>
+        <p:style>
+          <a:lnRef idx="2">
+            <a:schemeClr val="accent1">
+              <a:shade val="50000"/>
+            </a:schemeClr>
+          </a:lnRef>
+          <a:fillRef idx="1">
+            <a:schemeClr val="accent1"/>
+          </a:fillRef>
+          <a:effectRef idx="0">
+            <a:schemeClr val="accent1"/>
+          </a:effectRef>
+          <a:fontRef idx="minor">
+            <a:schemeClr val="lt1"/>
+          </a:fontRef>
+        </p:style>
+        <p:txBody>
+          <a:bodyPr rtlCol="0" anchor="ctr"/>
+          <a:lstStyle/>
+          <a:p>
+            <a:pPr algn="ctr"/>
+            <a:endParaRPr lang="de-DE"/>
+          </a:p>
+        </p:txBody>
+      </p:sp>
+      <p:sp>
+        <p:nvSpPr>
+          <p:cNvPr id="11" name="Ellipse 10"/>
+          <p:cNvSpPr/>
+          <p:nvPr/>
+        </p:nvSpPr>
+        <p:spPr>
+          <a:xfrm>
+            <a:off x="6562976" y="2510124"/>
+            <a:ext cx="277641" cy="277641"/>
+          </a:xfrm>
+          <a:prstGeom prst="ellipse">
+            <a:avLst/>
+          </a:prstGeom>
+          <a:solidFill>
+            <a:srgbClr val="5F7CB5"/>
+          </a:solidFill>
+          <a:ln>
+            <a:noFill/>
+          </a:ln>
+          <a:scene3d>
+            <a:camera prst="isometricLeftDown"/>
+            <a:lightRig rig="threePt" dir="t"/>
+          </a:scene3d>
+        </p:spPr>
+        <p:style>
+          <a:lnRef idx="2">
+            <a:schemeClr val="accent1">
+              <a:shade val="50000"/>
+            </a:schemeClr>
+          </a:lnRef>
+          <a:fillRef idx="1">
+            <a:schemeClr val="accent1"/>
+          </a:fillRef>
+          <a:effectRef idx="0">
+            <a:schemeClr val="accent1"/>
+          </a:effectRef>
+          <a:fontRef idx="minor">
+            <a:schemeClr val="lt1"/>
+          </a:fontRef>
+        </p:style>
+        <p:txBody>
+          <a:bodyPr rtlCol="0" anchor="ctr"/>
+          <a:lstStyle/>
+          <a:p>
+            <a:pPr algn="ctr"/>
+            <a:endParaRPr lang="de-DE"/>
+          </a:p>
+        </p:txBody>
+      </p:sp>
+      <p:sp>
+        <p:nvSpPr>
+          <p:cNvPr id="12" name="Rechteck 11"/>
+          <p:cNvSpPr/>
+          <p:nvPr/>
+        </p:nvSpPr>
+        <p:spPr>
+          <a:xfrm>
+            <a:off x="6387582" y="2236790"/>
+            <a:ext cx="267388" cy="164441"/>
+          </a:xfrm>
+          <a:prstGeom prst="rect">
+            <a:avLst/>
+          </a:prstGeom>
+          <a:solidFill>
+            <a:schemeClr val="tx1">
+              <a:lumMod val="60000"/>
+              <a:lumOff val="40000"/>
+            </a:schemeClr>
+          </a:solidFill>
+          <a:ln>
+            <a:noFill/>
+          </a:ln>
+          <a:scene3d>
+            <a:camera prst="isometricRightUp"/>
+            <a:lightRig rig="threePt" dir="t"/>
+          </a:scene3d>
+        </p:spPr>
+        <p:style>
+          <a:lnRef idx="2">
+            <a:schemeClr val="accent1">
+              <a:shade val="50000"/>
+            </a:schemeClr>
+          </a:lnRef>
+          <a:fillRef idx="1">
+            <a:schemeClr val="accent1"/>
+          </a:fillRef>
+          <a:effectRef idx="0">
+            <a:schemeClr val="accent1"/>
+          </a:effectRef>
+          <a:fontRef idx="minor">
+            <a:schemeClr val="lt1"/>
+          </a:fontRef>
+        </p:style>
+        <p:txBody>
+          <a:bodyPr rtlCol="0" anchor="ctr"/>
+          <a:lstStyle/>
+          <a:p>
+            <a:pPr algn="ctr"/>
+            <a:endParaRPr lang="de-DE"/>
+          </a:p>
+        </p:txBody>
+      </p:sp>
+      <p:sp>
+        <p:nvSpPr>
+          <p:cNvPr id="13" name="Ellipse 12"/>
+          <p:cNvSpPr/>
+          <p:nvPr/>
+        </p:nvSpPr>
+        <p:spPr>
+          <a:xfrm>
+            <a:off x="7079240" y="2202117"/>
+            <a:ext cx="233788" cy="233788"/>
+          </a:xfrm>
+          <a:prstGeom prst="ellipse">
+            <a:avLst/>
+          </a:prstGeom>
+          <a:solidFill>
+            <a:schemeClr val="tx1"/>
+          </a:solidFill>
+          <a:ln>
+            <a:noFill/>
+          </a:ln>
+          <a:scene3d>
+            <a:camera prst="isometricLeftDown"/>
+            <a:lightRig rig="threePt" dir="t"/>
+          </a:scene3d>
+        </p:spPr>
+        <p:style>
+          <a:lnRef idx="2">
+            <a:schemeClr val="accent1">
+              <a:shade val="50000"/>
+            </a:schemeClr>
+          </a:lnRef>
+          <a:fillRef idx="1">
+            <a:schemeClr val="accent1"/>
+          </a:fillRef>
+          <a:effectRef idx="0">
+            <a:schemeClr val="accent1"/>
+          </a:effectRef>
+          <a:fontRef idx="minor">
+            <a:schemeClr val="lt1"/>
+          </a:fontRef>
+        </p:style>
+        <p:txBody>
+          <a:bodyPr rtlCol="0" anchor="ctr"/>
+          <a:lstStyle/>
+          <a:p>
+            <a:pPr algn="ctr"/>
+            <a:endParaRPr lang="de-DE"/>
+          </a:p>
+        </p:txBody>
+      </p:sp>
+    </p:spTree>
+    <p:extLst>
+      <p:ext uri="{BB962C8B-B14F-4D97-AF65-F5344CB8AC3E}">
+        <p14:creationId xmlns:p14="http://schemas.microsoft.com/office/powerpoint/2010/main" val="2055194667"/>
+      </p:ext>
+    </p:extLst>
+  </p:cSld>
+  <p:clrMapOvr>
+    <a:masterClrMapping/>
+  </p:clrMapOvr>
 </p:sld>
 </file>
 

</xml_diff>